<commit_message>
updated plots and keras post
</commit_message>
<xml_diff>
--- a/images/0002-keras-ETF/NN_model.pptx
+++ b/images/0002-keras-ETF/NN_model.pptx
@@ -10,6 +10,7 @@
     <p:sldId id="258" r:id="rId4"/>
     <p:sldId id="259" r:id="rId5"/>
     <p:sldId id="260" r:id="rId6"/>
+    <p:sldId id="261" r:id="rId7"/>
   </p:sldIdLst>
   <p:sldSz cx="12192000" cy="6858000"/>
   <p:notesSz cx="6858000" cy="9144000"/>
@@ -108,6 +109,11 @@
       </a:defRPr>
     </a:lvl9pPr>
   </p:defaultTextStyle>
+  <p:extLst>
+    <p:ext uri="{EFAFB233-063F-42B5-8137-9DF3F51BA10A}">
+      <p15:sldGuideLst xmlns:p15="http://schemas.microsoft.com/office/powerpoint/2012/main"/>
+    </p:ext>
+  </p:extLst>
 </p:presentation>
 </file>
 
@@ -242,7 +248,7 @@
           <a:p>
             <a:fld id="{9CCD94D7-C1D9-4428-ACBA-2AB75D67A682}" type="datetimeFigureOut">
               <a:rPr lang="en-US" smtClean="0"/>
-              <a:t>8/2/2018</a:t>
+              <a:t>8/16/2018</a:t>
             </a:fld>
             <a:endParaRPr lang="en-US"/>
           </a:p>
@@ -412,7 +418,7 @@
           <a:p>
             <a:fld id="{9CCD94D7-C1D9-4428-ACBA-2AB75D67A682}" type="datetimeFigureOut">
               <a:rPr lang="en-US" smtClean="0"/>
-              <a:t>8/2/2018</a:t>
+              <a:t>8/16/2018</a:t>
             </a:fld>
             <a:endParaRPr lang="en-US"/>
           </a:p>
@@ -592,7 +598,7 @@
           <a:p>
             <a:fld id="{9CCD94D7-C1D9-4428-ACBA-2AB75D67A682}" type="datetimeFigureOut">
               <a:rPr lang="en-US" smtClean="0"/>
-              <a:t>8/2/2018</a:t>
+              <a:t>8/16/2018</a:t>
             </a:fld>
             <a:endParaRPr lang="en-US"/>
           </a:p>
@@ -762,7 +768,7 @@
           <a:p>
             <a:fld id="{9CCD94D7-C1D9-4428-ACBA-2AB75D67A682}" type="datetimeFigureOut">
               <a:rPr lang="en-US" smtClean="0"/>
-              <a:t>8/2/2018</a:t>
+              <a:t>8/16/2018</a:t>
             </a:fld>
             <a:endParaRPr lang="en-US"/>
           </a:p>
@@ -1008,7 +1014,7 @@
           <a:p>
             <a:fld id="{9CCD94D7-C1D9-4428-ACBA-2AB75D67A682}" type="datetimeFigureOut">
               <a:rPr lang="en-US" smtClean="0"/>
-              <a:t>8/2/2018</a:t>
+              <a:t>8/16/2018</a:t>
             </a:fld>
             <a:endParaRPr lang="en-US"/>
           </a:p>
@@ -1240,7 +1246,7 @@
           <a:p>
             <a:fld id="{9CCD94D7-C1D9-4428-ACBA-2AB75D67A682}" type="datetimeFigureOut">
               <a:rPr lang="en-US" smtClean="0"/>
-              <a:t>8/2/2018</a:t>
+              <a:t>8/16/2018</a:t>
             </a:fld>
             <a:endParaRPr lang="en-US"/>
           </a:p>
@@ -1607,7 +1613,7 @@
           <a:p>
             <a:fld id="{9CCD94D7-C1D9-4428-ACBA-2AB75D67A682}" type="datetimeFigureOut">
               <a:rPr lang="en-US" smtClean="0"/>
-              <a:t>8/2/2018</a:t>
+              <a:t>8/16/2018</a:t>
             </a:fld>
             <a:endParaRPr lang="en-US"/>
           </a:p>
@@ -1725,7 +1731,7 @@
           <a:p>
             <a:fld id="{9CCD94D7-C1D9-4428-ACBA-2AB75D67A682}" type="datetimeFigureOut">
               <a:rPr lang="en-US" smtClean="0"/>
-              <a:t>8/2/2018</a:t>
+              <a:t>8/16/2018</a:t>
             </a:fld>
             <a:endParaRPr lang="en-US"/>
           </a:p>
@@ -1820,7 +1826,7 @@
           <a:p>
             <a:fld id="{9CCD94D7-C1D9-4428-ACBA-2AB75D67A682}" type="datetimeFigureOut">
               <a:rPr lang="en-US" smtClean="0"/>
-              <a:t>8/2/2018</a:t>
+              <a:t>8/16/2018</a:t>
             </a:fld>
             <a:endParaRPr lang="en-US"/>
           </a:p>
@@ -2097,7 +2103,7 @@
           <a:p>
             <a:fld id="{9CCD94D7-C1D9-4428-ACBA-2AB75D67A682}" type="datetimeFigureOut">
               <a:rPr lang="en-US" smtClean="0"/>
-              <a:t>8/2/2018</a:t>
+              <a:t>8/16/2018</a:t>
             </a:fld>
             <a:endParaRPr lang="en-US"/>
           </a:p>
@@ -2350,7 +2356,7 @@
           <a:p>
             <a:fld id="{9CCD94D7-C1D9-4428-ACBA-2AB75D67A682}" type="datetimeFigureOut">
               <a:rPr lang="en-US" smtClean="0"/>
-              <a:t>8/2/2018</a:t>
+              <a:t>8/16/2018</a:t>
             </a:fld>
             <a:endParaRPr lang="en-US"/>
           </a:p>
@@ -2563,7 +2569,7 @@
           <a:p>
             <a:fld id="{9CCD94D7-C1D9-4428-ACBA-2AB75D67A682}" type="datetimeFigureOut">
               <a:rPr lang="en-US" smtClean="0"/>
-              <a:t>8/2/2018</a:t>
+              <a:t>8/16/2018</a:t>
             </a:fld>
             <a:endParaRPr lang="en-US"/>
           </a:p>
@@ -14447,6 +14453,4607 @@
 </p:sld>
 </file>
 
+<file path=ppt/slides/slide6.xml><?xml version="1.0" encoding="utf-8"?>
+<p:sld xmlns:a="http://schemas.openxmlformats.org/drawingml/2006/main" xmlns:r="http://schemas.openxmlformats.org/officeDocument/2006/relationships" xmlns:p="http://schemas.openxmlformats.org/presentationml/2006/main">
+  <p:cSld>
+    <p:spTree>
+      <p:nvGrpSpPr>
+        <p:cNvPr id="1" name=""/>
+        <p:cNvGrpSpPr/>
+        <p:nvPr/>
+      </p:nvGrpSpPr>
+      <p:grpSpPr>
+        <a:xfrm>
+          <a:off x="0" y="0"/>
+          <a:ext cx="0" cy="0"/>
+          <a:chOff x="0" y="0"/>
+          <a:chExt cx="0" cy="0"/>
+        </a:xfrm>
+      </p:grpSpPr>
+      <p:sp>
+        <p:nvSpPr>
+          <p:cNvPr id="3" name="Oval 2"/>
+          <p:cNvSpPr/>
+          <p:nvPr/>
+        </p:nvSpPr>
+        <p:spPr>
+          <a:xfrm>
+            <a:off x="8259900" y="1479379"/>
+            <a:ext cx="615142" cy="598517"/>
+          </a:xfrm>
+          <a:prstGeom prst="ellipse">
+            <a:avLst/>
+          </a:prstGeom>
+          <a:solidFill>
+            <a:schemeClr val="accent1">
+              <a:lumMod val="60000"/>
+              <a:lumOff val="40000"/>
+            </a:schemeClr>
+          </a:solidFill>
+          <a:ln w="50800"/>
+          <a:effectLst>
+            <a:outerShdw blurRad="50800" dist="38100" dir="8100000" algn="tr" rotWithShape="0">
+              <a:prstClr val="black">
+                <a:alpha val="40000"/>
+              </a:prstClr>
+            </a:outerShdw>
+          </a:effectLst>
+        </p:spPr>
+        <p:style>
+          <a:lnRef idx="2">
+            <a:schemeClr val="accent1">
+              <a:shade val="50000"/>
+            </a:schemeClr>
+          </a:lnRef>
+          <a:fillRef idx="1">
+            <a:schemeClr val="accent1"/>
+          </a:fillRef>
+          <a:effectRef idx="0">
+            <a:schemeClr val="accent1"/>
+          </a:effectRef>
+          <a:fontRef idx="minor">
+            <a:schemeClr val="lt1"/>
+          </a:fontRef>
+        </p:style>
+        <p:txBody>
+          <a:bodyPr rtlCol="0" anchor="ctr"/>
+          <a:lstStyle/>
+          <a:p>
+            <a:pPr algn="ctr"/>
+            <a:endParaRPr lang="en-US"/>
+          </a:p>
+        </p:txBody>
+      </p:sp>
+      <p:sp>
+        <p:nvSpPr>
+          <p:cNvPr id="4" name="Oval 3"/>
+          <p:cNvSpPr/>
+          <p:nvPr/>
+        </p:nvSpPr>
+        <p:spPr>
+          <a:xfrm>
+            <a:off x="8259900" y="2255234"/>
+            <a:ext cx="615142" cy="598517"/>
+          </a:xfrm>
+          <a:prstGeom prst="ellipse">
+            <a:avLst/>
+          </a:prstGeom>
+          <a:solidFill>
+            <a:schemeClr val="accent1">
+              <a:lumMod val="60000"/>
+              <a:lumOff val="40000"/>
+            </a:schemeClr>
+          </a:solidFill>
+          <a:ln w="50800"/>
+          <a:effectLst>
+            <a:outerShdw blurRad="50800" dist="38100" dir="8100000" algn="tr" rotWithShape="0">
+              <a:prstClr val="black">
+                <a:alpha val="40000"/>
+              </a:prstClr>
+            </a:outerShdw>
+          </a:effectLst>
+        </p:spPr>
+        <p:style>
+          <a:lnRef idx="2">
+            <a:schemeClr val="accent1">
+              <a:shade val="50000"/>
+            </a:schemeClr>
+          </a:lnRef>
+          <a:fillRef idx="1">
+            <a:schemeClr val="accent1"/>
+          </a:fillRef>
+          <a:effectRef idx="0">
+            <a:schemeClr val="accent1"/>
+          </a:effectRef>
+          <a:fontRef idx="minor">
+            <a:schemeClr val="lt1"/>
+          </a:fontRef>
+        </p:style>
+        <p:txBody>
+          <a:bodyPr rtlCol="0" anchor="ctr"/>
+          <a:lstStyle/>
+          <a:p>
+            <a:pPr algn="ctr"/>
+            <a:endParaRPr lang="en-US"/>
+          </a:p>
+        </p:txBody>
+      </p:sp>
+      <p:sp>
+        <p:nvSpPr>
+          <p:cNvPr id="5" name="TextBox 4"/>
+          <p:cNvSpPr txBox="1"/>
+          <p:nvPr/>
+        </p:nvSpPr>
+        <p:spPr>
+          <a:xfrm>
+            <a:off x="9149362" y="1593971"/>
+            <a:ext cx="2106795" cy="369332"/>
+          </a:xfrm>
+          <a:prstGeom prst="rect">
+            <a:avLst/>
+          </a:prstGeom>
+          <a:noFill/>
+          <a:effectLst>
+            <a:softEdge rad="25400"/>
+          </a:effectLst>
+        </p:spPr>
+        <p:txBody>
+          <a:bodyPr wrap="none" rtlCol="0">
+            <a:spAutoFit/>
+          </a:bodyPr>
+          <a:lstStyle/>
+          <a:p>
+            <a:r>
+              <a:rPr lang="en-US" b="1" dirty="0" smtClean="0">
+                <a:latin typeface="Segoe UI" panose="020B0502040204020203" pitchFamily="34" charset="0"/>
+                <a:cs typeface="Segoe UI" panose="020B0502040204020203" pitchFamily="34" charset="0"/>
+              </a:rPr>
+              <a:t>Technology (IYW)</a:t>
+            </a:r>
+            <a:endParaRPr lang="en-US" b="1" dirty="0">
+              <a:latin typeface="Segoe UI" panose="020B0502040204020203" pitchFamily="34" charset="0"/>
+              <a:cs typeface="Segoe UI" panose="020B0502040204020203" pitchFamily="34" charset="0"/>
+            </a:endParaRPr>
+          </a:p>
+        </p:txBody>
+      </p:sp>
+      <p:sp>
+        <p:nvSpPr>
+          <p:cNvPr id="6" name="TextBox 5"/>
+          <p:cNvSpPr txBox="1"/>
+          <p:nvPr/>
+        </p:nvSpPr>
+        <p:spPr>
+          <a:xfrm>
+            <a:off x="9149362" y="2369826"/>
+            <a:ext cx="2472152" cy="369332"/>
+          </a:xfrm>
+          <a:prstGeom prst="rect">
+            <a:avLst/>
+          </a:prstGeom>
+          <a:noFill/>
+          <a:effectLst>
+            <a:softEdge rad="25400"/>
+          </a:effectLst>
+        </p:spPr>
+        <p:txBody>
+          <a:bodyPr wrap="none" rtlCol="0">
+            <a:spAutoFit/>
+          </a:bodyPr>
+          <a:lstStyle/>
+          <a:p>
+            <a:r>
+              <a:rPr lang="en-US" b="1" dirty="0" smtClean="0">
+                <a:latin typeface="Segoe UI" panose="020B0502040204020203" pitchFamily="34" charset="0"/>
+                <a:cs typeface="Segoe UI" panose="020B0502040204020203" pitchFamily="34" charset="0"/>
+              </a:rPr>
+              <a:t>Basic Materials (IYM)</a:t>
+            </a:r>
+            <a:endParaRPr lang="en-US" b="1" dirty="0">
+              <a:latin typeface="Segoe UI" panose="020B0502040204020203" pitchFamily="34" charset="0"/>
+              <a:cs typeface="Segoe UI" panose="020B0502040204020203" pitchFamily="34" charset="0"/>
+            </a:endParaRPr>
+          </a:p>
+        </p:txBody>
+      </p:sp>
+      <p:sp>
+        <p:nvSpPr>
+          <p:cNvPr id="7" name="Oval 6"/>
+          <p:cNvSpPr/>
+          <p:nvPr/>
+        </p:nvSpPr>
+        <p:spPr>
+          <a:xfrm>
+            <a:off x="8259900" y="3028318"/>
+            <a:ext cx="615142" cy="598517"/>
+          </a:xfrm>
+          <a:prstGeom prst="ellipse">
+            <a:avLst/>
+          </a:prstGeom>
+          <a:solidFill>
+            <a:schemeClr val="accent1">
+              <a:lumMod val="60000"/>
+              <a:lumOff val="40000"/>
+            </a:schemeClr>
+          </a:solidFill>
+          <a:ln w="50800"/>
+          <a:effectLst>
+            <a:outerShdw blurRad="50800" dist="38100" dir="8100000" algn="tr" rotWithShape="0">
+              <a:prstClr val="black">
+                <a:alpha val="40000"/>
+              </a:prstClr>
+            </a:outerShdw>
+          </a:effectLst>
+        </p:spPr>
+        <p:style>
+          <a:lnRef idx="2">
+            <a:schemeClr val="accent1">
+              <a:shade val="50000"/>
+            </a:schemeClr>
+          </a:lnRef>
+          <a:fillRef idx="1">
+            <a:schemeClr val="accent1"/>
+          </a:fillRef>
+          <a:effectRef idx="0">
+            <a:schemeClr val="accent1"/>
+          </a:effectRef>
+          <a:fontRef idx="minor">
+            <a:schemeClr val="lt1"/>
+          </a:fontRef>
+        </p:style>
+        <p:txBody>
+          <a:bodyPr rtlCol="0" anchor="ctr"/>
+          <a:lstStyle/>
+          <a:p>
+            <a:pPr algn="ctr"/>
+            <a:endParaRPr lang="en-US"/>
+          </a:p>
+        </p:txBody>
+      </p:sp>
+      <p:sp>
+        <p:nvSpPr>
+          <p:cNvPr id="8" name="TextBox 7"/>
+          <p:cNvSpPr txBox="1"/>
+          <p:nvPr/>
+        </p:nvSpPr>
+        <p:spPr>
+          <a:xfrm>
+            <a:off x="9149362" y="3142910"/>
+            <a:ext cx="2627642" cy="369332"/>
+          </a:xfrm>
+          <a:prstGeom prst="rect">
+            <a:avLst/>
+          </a:prstGeom>
+          <a:noFill/>
+          <a:effectLst>
+            <a:softEdge rad="25400"/>
+          </a:effectLst>
+        </p:spPr>
+        <p:txBody>
+          <a:bodyPr wrap="none" rtlCol="0">
+            <a:spAutoFit/>
+          </a:bodyPr>
+          <a:lstStyle/>
+          <a:p>
+            <a:r>
+              <a:rPr lang="en-US" b="1" dirty="0" smtClean="0">
+                <a:latin typeface="Segoe UI" panose="020B0502040204020203" pitchFamily="34" charset="0"/>
+                <a:cs typeface="Segoe UI" panose="020B0502040204020203" pitchFamily="34" charset="0"/>
+              </a:rPr>
+              <a:t>Consumer Goods (IYK)</a:t>
+            </a:r>
+            <a:endParaRPr lang="en-US" b="1" dirty="0">
+              <a:latin typeface="Segoe UI" panose="020B0502040204020203" pitchFamily="34" charset="0"/>
+              <a:cs typeface="Segoe UI" panose="020B0502040204020203" pitchFamily="34" charset="0"/>
+            </a:endParaRPr>
+          </a:p>
+        </p:txBody>
+      </p:sp>
+      <p:sp>
+        <p:nvSpPr>
+          <p:cNvPr id="15" name="Oval 14"/>
+          <p:cNvSpPr/>
+          <p:nvPr/>
+        </p:nvSpPr>
+        <p:spPr>
+          <a:xfrm>
+            <a:off x="2710148" y="1202362"/>
+            <a:ext cx="426720" cy="419131"/>
+          </a:xfrm>
+          <a:prstGeom prst="ellipse">
+            <a:avLst/>
+          </a:prstGeom>
+          <a:solidFill>
+            <a:schemeClr val="accent1">
+              <a:lumMod val="60000"/>
+              <a:lumOff val="40000"/>
+            </a:schemeClr>
+          </a:solidFill>
+          <a:ln w="50800"/>
+          <a:effectLst>
+            <a:outerShdw blurRad="50800" dist="38100" dir="8100000" algn="tr" rotWithShape="0">
+              <a:prstClr val="black">
+                <a:alpha val="40000"/>
+              </a:prstClr>
+            </a:outerShdw>
+          </a:effectLst>
+        </p:spPr>
+        <p:style>
+          <a:lnRef idx="2">
+            <a:schemeClr val="accent1">
+              <a:shade val="50000"/>
+            </a:schemeClr>
+          </a:lnRef>
+          <a:fillRef idx="1">
+            <a:schemeClr val="accent1"/>
+          </a:fillRef>
+          <a:effectRef idx="0">
+            <a:schemeClr val="accent1"/>
+          </a:effectRef>
+          <a:fontRef idx="minor">
+            <a:schemeClr val="lt1"/>
+          </a:fontRef>
+        </p:style>
+        <p:txBody>
+          <a:bodyPr rtlCol="0" anchor="ctr"/>
+          <a:lstStyle/>
+          <a:p>
+            <a:pPr algn="ctr"/>
+            <a:endParaRPr lang="en-US"/>
+          </a:p>
+        </p:txBody>
+      </p:sp>
+      <p:sp>
+        <p:nvSpPr>
+          <p:cNvPr id="16" name="Oval 15"/>
+          <p:cNvSpPr/>
+          <p:nvPr/>
+        </p:nvSpPr>
+        <p:spPr>
+          <a:xfrm>
+            <a:off x="2710148" y="1698638"/>
+            <a:ext cx="426720" cy="419131"/>
+          </a:xfrm>
+          <a:prstGeom prst="ellipse">
+            <a:avLst/>
+          </a:prstGeom>
+          <a:solidFill>
+            <a:schemeClr val="accent1">
+              <a:lumMod val="60000"/>
+              <a:lumOff val="40000"/>
+            </a:schemeClr>
+          </a:solidFill>
+          <a:ln w="50800"/>
+          <a:effectLst>
+            <a:outerShdw blurRad="50800" dist="38100" dir="8100000" algn="tr" rotWithShape="0">
+              <a:prstClr val="black">
+                <a:alpha val="40000"/>
+              </a:prstClr>
+            </a:outerShdw>
+          </a:effectLst>
+        </p:spPr>
+        <p:style>
+          <a:lnRef idx="2">
+            <a:schemeClr val="accent1">
+              <a:shade val="50000"/>
+            </a:schemeClr>
+          </a:lnRef>
+          <a:fillRef idx="1">
+            <a:schemeClr val="accent1"/>
+          </a:fillRef>
+          <a:effectRef idx="0">
+            <a:schemeClr val="accent1"/>
+          </a:effectRef>
+          <a:fontRef idx="minor">
+            <a:schemeClr val="lt1"/>
+          </a:fontRef>
+        </p:style>
+        <p:txBody>
+          <a:bodyPr rtlCol="0" anchor="ctr"/>
+          <a:lstStyle/>
+          <a:p>
+            <a:pPr algn="ctr"/>
+            <a:endParaRPr lang="en-US"/>
+          </a:p>
+        </p:txBody>
+      </p:sp>
+      <p:sp>
+        <p:nvSpPr>
+          <p:cNvPr id="17" name="TextBox 16"/>
+          <p:cNvSpPr txBox="1"/>
+          <p:nvPr/>
+        </p:nvSpPr>
+        <p:spPr>
+          <a:xfrm>
+            <a:off x="1520653" y="1258038"/>
+            <a:ext cx="1052335" cy="307777"/>
+          </a:xfrm>
+          <a:prstGeom prst="rect">
+            <a:avLst/>
+          </a:prstGeom>
+          <a:noFill/>
+          <a:effectLst>
+            <a:softEdge rad="25400"/>
+          </a:effectLst>
+        </p:spPr>
+        <p:txBody>
+          <a:bodyPr wrap="square" rtlCol="0">
+            <a:spAutoFit/>
+          </a:bodyPr>
+          <a:lstStyle/>
+          <a:p>
+            <a:pPr algn="r"/>
+            <a:r>
+              <a:rPr lang="en-US" sz="1400" b="1" dirty="0" smtClean="0">
+                <a:latin typeface="Segoe UI" panose="020B0502040204020203" pitchFamily="34" charset="0"/>
+                <a:cs typeface="Segoe UI" panose="020B0502040204020203" pitchFamily="34" charset="0"/>
+              </a:rPr>
+              <a:t>HOUST</a:t>
+            </a:r>
+            <a:endParaRPr lang="en-US" sz="1400" b="1" dirty="0">
+              <a:latin typeface="Segoe UI" panose="020B0502040204020203" pitchFamily="34" charset="0"/>
+              <a:cs typeface="Segoe UI" panose="020B0502040204020203" pitchFamily="34" charset="0"/>
+            </a:endParaRPr>
+          </a:p>
+        </p:txBody>
+      </p:sp>
+      <p:sp>
+        <p:nvSpPr>
+          <p:cNvPr id="18" name="TextBox 17"/>
+          <p:cNvSpPr txBox="1"/>
+          <p:nvPr/>
+        </p:nvSpPr>
+        <p:spPr>
+          <a:xfrm>
+            <a:off x="914401" y="1758852"/>
+            <a:ext cx="1658587" cy="307777"/>
+          </a:xfrm>
+          <a:prstGeom prst="rect">
+            <a:avLst/>
+          </a:prstGeom>
+          <a:noFill/>
+          <a:effectLst>
+            <a:softEdge rad="25400"/>
+          </a:effectLst>
+        </p:spPr>
+        <p:txBody>
+          <a:bodyPr wrap="square" rtlCol="0">
+            <a:spAutoFit/>
+          </a:bodyPr>
+          <a:lstStyle/>
+          <a:p>
+            <a:pPr algn="r"/>
+            <a:r>
+              <a:rPr lang="en-US" sz="1400" b="1" dirty="0" smtClean="0">
+                <a:latin typeface="Segoe UI" panose="020B0502040204020203" pitchFamily="34" charset="0"/>
+                <a:cs typeface="Segoe UI" panose="020B0502040204020203" pitchFamily="34" charset="0"/>
+              </a:rPr>
+              <a:t>UNRATENSA</a:t>
+            </a:r>
+            <a:endParaRPr lang="en-US" sz="1400" b="1" dirty="0">
+              <a:latin typeface="Segoe UI" panose="020B0502040204020203" pitchFamily="34" charset="0"/>
+              <a:cs typeface="Segoe UI" panose="020B0502040204020203" pitchFamily="34" charset="0"/>
+            </a:endParaRPr>
+          </a:p>
+        </p:txBody>
+      </p:sp>
+      <p:sp>
+        <p:nvSpPr>
+          <p:cNvPr id="19" name="Oval 18"/>
+          <p:cNvSpPr/>
+          <p:nvPr/>
+        </p:nvSpPr>
+        <p:spPr>
+          <a:xfrm>
+            <a:off x="2710148" y="2194914"/>
+            <a:ext cx="426720" cy="419131"/>
+          </a:xfrm>
+          <a:prstGeom prst="ellipse">
+            <a:avLst/>
+          </a:prstGeom>
+          <a:solidFill>
+            <a:schemeClr val="accent1">
+              <a:lumMod val="60000"/>
+              <a:lumOff val="40000"/>
+            </a:schemeClr>
+          </a:solidFill>
+          <a:ln w="50800"/>
+          <a:effectLst>
+            <a:outerShdw blurRad="50800" dist="38100" dir="8100000" algn="tr" rotWithShape="0">
+              <a:prstClr val="black">
+                <a:alpha val="40000"/>
+              </a:prstClr>
+            </a:outerShdw>
+          </a:effectLst>
+        </p:spPr>
+        <p:style>
+          <a:lnRef idx="2">
+            <a:schemeClr val="accent1">
+              <a:shade val="50000"/>
+            </a:schemeClr>
+          </a:lnRef>
+          <a:fillRef idx="1">
+            <a:schemeClr val="accent1"/>
+          </a:fillRef>
+          <a:effectRef idx="0">
+            <a:schemeClr val="accent1"/>
+          </a:effectRef>
+          <a:fontRef idx="minor">
+            <a:schemeClr val="lt1"/>
+          </a:fontRef>
+        </p:style>
+        <p:txBody>
+          <a:bodyPr rtlCol="0" anchor="ctr"/>
+          <a:lstStyle/>
+          <a:p>
+            <a:pPr algn="ctr"/>
+            <a:endParaRPr lang="en-US"/>
+          </a:p>
+        </p:txBody>
+      </p:sp>
+      <p:sp>
+        <p:nvSpPr>
+          <p:cNvPr id="20" name="TextBox 19"/>
+          <p:cNvSpPr txBox="1"/>
+          <p:nvPr/>
+        </p:nvSpPr>
+        <p:spPr>
+          <a:xfrm>
+            <a:off x="1257648" y="2253249"/>
+            <a:ext cx="1315340" cy="307777"/>
+          </a:xfrm>
+          <a:prstGeom prst="rect">
+            <a:avLst/>
+          </a:prstGeom>
+          <a:noFill/>
+          <a:effectLst>
+            <a:softEdge rad="25400"/>
+          </a:effectLst>
+        </p:spPr>
+        <p:txBody>
+          <a:bodyPr wrap="square" rtlCol="0">
+            <a:spAutoFit/>
+          </a:bodyPr>
+          <a:lstStyle/>
+          <a:p>
+            <a:pPr algn="r"/>
+            <a:r>
+              <a:rPr lang="en-US" sz="1400" b="1" dirty="0" smtClean="0">
+                <a:latin typeface="Segoe UI" panose="020B0502040204020203" pitchFamily="34" charset="0"/>
+                <a:cs typeface="Segoe UI" panose="020B0502040204020203" pitchFamily="34" charset="0"/>
+              </a:rPr>
+              <a:t>EMRATIO</a:t>
+            </a:r>
+            <a:endParaRPr lang="en-US" sz="1400" b="1" dirty="0">
+              <a:latin typeface="Segoe UI" panose="020B0502040204020203" pitchFamily="34" charset="0"/>
+              <a:cs typeface="Segoe UI" panose="020B0502040204020203" pitchFamily="34" charset="0"/>
+            </a:endParaRPr>
+          </a:p>
+        </p:txBody>
+      </p:sp>
+      <p:sp>
+        <p:nvSpPr>
+          <p:cNvPr id="23" name="TextBox 22"/>
+          <p:cNvSpPr txBox="1"/>
+          <p:nvPr/>
+        </p:nvSpPr>
+        <p:spPr>
+          <a:xfrm>
+            <a:off x="1063549" y="2746866"/>
+            <a:ext cx="1509439" cy="307777"/>
+          </a:xfrm>
+          <a:prstGeom prst="rect">
+            <a:avLst/>
+          </a:prstGeom>
+          <a:noFill/>
+          <a:effectLst>
+            <a:softEdge rad="25400"/>
+          </a:effectLst>
+        </p:spPr>
+        <p:txBody>
+          <a:bodyPr wrap="square" rtlCol="0">
+            <a:spAutoFit/>
+          </a:bodyPr>
+          <a:lstStyle/>
+          <a:p>
+            <a:pPr algn="r"/>
+            <a:r>
+              <a:rPr lang="en-US" sz="1400" b="1" dirty="0" smtClean="0">
+                <a:latin typeface="Segoe UI" panose="020B0502040204020203" pitchFamily="34" charset="0"/>
+                <a:cs typeface="Segoe UI" panose="020B0502040204020203" pitchFamily="34" charset="0"/>
+              </a:rPr>
+              <a:t>UEMPMED</a:t>
+            </a:r>
+            <a:endParaRPr lang="en-US" sz="1400" b="1" dirty="0">
+              <a:latin typeface="Segoe UI" panose="020B0502040204020203" pitchFamily="34" charset="0"/>
+              <a:cs typeface="Segoe UI" panose="020B0502040204020203" pitchFamily="34" charset="0"/>
+            </a:endParaRPr>
+          </a:p>
+        </p:txBody>
+      </p:sp>
+      <p:sp>
+        <p:nvSpPr>
+          <p:cNvPr id="24" name="TextBox 23"/>
+          <p:cNvSpPr txBox="1"/>
+          <p:nvPr/>
+        </p:nvSpPr>
+        <p:spPr>
+          <a:xfrm>
+            <a:off x="1163355" y="3243142"/>
+            <a:ext cx="1409634" cy="307777"/>
+          </a:xfrm>
+          <a:prstGeom prst="rect">
+            <a:avLst/>
+          </a:prstGeom>
+          <a:noFill/>
+          <a:effectLst>
+            <a:softEdge rad="25400"/>
+          </a:effectLst>
+        </p:spPr>
+        <p:txBody>
+          <a:bodyPr wrap="square" rtlCol="0">
+            <a:spAutoFit/>
+          </a:bodyPr>
+          <a:lstStyle/>
+          <a:p>
+            <a:pPr algn="r"/>
+            <a:r>
+              <a:rPr lang="en-US" sz="1400" b="1" dirty="0" smtClean="0">
+                <a:latin typeface="Segoe UI" panose="020B0502040204020203" pitchFamily="34" charset="0"/>
+                <a:cs typeface="Segoe UI" panose="020B0502040204020203" pitchFamily="34" charset="0"/>
+              </a:rPr>
+              <a:t>UMSCENT</a:t>
+            </a:r>
+            <a:endParaRPr lang="en-US" sz="1400" b="1" dirty="0">
+              <a:latin typeface="Segoe UI" panose="020B0502040204020203" pitchFamily="34" charset="0"/>
+              <a:cs typeface="Segoe UI" panose="020B0502040204020203" pitchFamily="34" charset="0"/>
+            </a:endParaRPr>
+          </a:p>
+        </p:txBody>
+      </p:sp>
+      <p:sp>
+        <p:nvSpPr>
+          <p:cNvPr id="26" name="TextBox 25"/>
+          <p:cNvSpPr txBox="1"/>
+          <p:nvPr/>
+        </p:nvSpPr>
+        <p:spPr>
+          <a:xfrm>
+            <a:off x="1339009" y="3733184"/>
+            <a:ext cx="1233979" cy="307777"/>
+          </a:xfrm>
+          <a:prstGeom prst="rect">
+            <a:avLst/>
+          </a:prstGeom>
+          <a:noFill/>
+          <a:effectLst>
+            <a:softEdge rad="25400"/>
+          </a:effectLst>
+        </p:spPr>
+        <p:txBody>
+          <a:bodyPr wrap="square" rtlCol="0">
+            <a:spAutoFit/>
+          </a:bodyPr>
+          <a:lstStyle/>
+          <a:p>
+            <a:pPr algn="r"/>
+            <a:r>
+              <a:rPr lang="en-US" sz="1400" b="1" dirty="0" smtClean="0">
+                <a:latin typeface="Segoe UI" panose="020B0502040204020203" pitchFamily="34" charset="0"/>
+                <a:cs typeface="Segoe UI" panose="020B0502040204020203" pitchFamily="34" charset="0"/>
+              </a:rPr>
+              <a:t>USSLIND</a:t>
+            </a:r>
+            <a:endParaRPr lang="en-US" sz="1400" b="1" dirty="0">
+              <a:latin typeface="Segoe UI" panose="020B0502040204020203" pitchFamily="34" charset="0"/>
+              <a:cs typeface="Segoe UI" panose="020B0502040204020203" pitchFamily="34" charset="0"/>
+            </a:endParaRPr>
+          </a:p>
+        </p:txBody>
+      </p:sp>
+      <p:sp>
+        <p:nvSpPr>
+          <p:cNvPr id="28" name="TextBox 27"/>
+          <p:cNvSpPr txBox="1"/>
+          <p:nvPr/>
+        </p:nvSpPr>
+        <p:spPr>
+          <a:xfrm>
+            <a:off x="1257648" y="4231936"/>
+            <a:ext cx="1315340" cy="307777"/>
+          </a:xfrm>
+          <a:prstGeom prst="rect">
+            <a:avLst/>
+          </a:prstGeom>
+          <a:noFill/>
+          <a:effectLst>
+            <a:softEdge rad="25400"/>
+          </a:effectLst>
+        </p:spPr>
+        <p:txBody>
+          <a:bodyPr wrap="square" rtlCol="0">
+            <a:spAutoFit/>
+          </a:bodyPr>
+          <a:lstStyle/>
+          <a:p>
+            <a:pPr algn="r"/>
+            <a:r>
+              <a:rPr lang="en-US" sz="1400" b="1" dirty="0" smtClean="0">
+                <a:latin typeface="Segoe UI" panose="020B0502040204020203" pitchFamily="34" charset="0"/>
+                <a:cs typeface="Segoe UI" panose="020B0502040204020203" pitchFamily="34" charset="0"/>
+              </a:rPr>
+              <a:t>EMRATIO</a:t>
+            </a:r>
+            <a:endParaRPr lang="en-US" sz="1400" b="1" dirty="0">
+              <a:latin typeface="Segoe UI" panose="020B0502040204020203" pitchFamily="34" charset="0"/>
+              <a:cs typeface="Segoe UI" panose="020B0502040204020203" pitchFamily="34" charset="0"/>
+            </a:endParaRPr>
+          </a:p>
+        </p:txBody>
+      </p:sp>
+      <p:sp>
+        <p:nvSpPr>
+          <p:cNvPr id="31" name="TextBox 30"/>
+          <p:cNvSpPr txBox="1"/>
+          <p:nvPr/>
+        </p:nvSpPr>
+        <p:spPr>
+          <a:xfrm>
+            <a:off x="1063549" y="4730688"/>
+            <a:ext cx="1509439" cy="307777"/>
+          </a:xfrm>
+          <a:prstGeom prst="rect">
+            <a:avLst/>
+          </a:prstGeom>
+          <a:noFill/>
+          <a:effectLst>
+            <a:softEdge rad="25400"/>
+          </a:effectLst>
+        </p:spPr>
+        <p:txBody>
+          <a:bodyPr wrap="square" rtlCol="0">
+            <a:spAutoFit/>
+          </a:bodyPr>
+          <a:lstStyle/>
+          <a:p>
+            <a:pPr algn="r"/>
+            <a:r>
+              <a:rPr lang="en-US" sz="1400" b="1" dirty="0" smtClean="0">
+                <a:latin typeface="Segoe UI" panose="020B0502040204020203" pitchFamily="34" charset="0"/>
+                <a:cs typeface="Segoe UI" panose="020B0502040204020203" pitchFamily="34" charset="0"/>
+              </a:rPr>
+              <a:t>UEMPMED</a:t>
+            </a:r>
+            <a:endParaRPr lang="en-US" sz="1400" b="1" dirty="0">
+              <a:latin typeface="Segoe UI" panose="020B0502040204020203" pitchFamily="34" charset="0"/>
+              <a:cs typeface="Segoe UI" panose="020B0502040204020203" pitchFamily="34" charset="0"/>
+            </a:endParaRPr>
+          </a:p>
+        </p:txBody>
+      </p:sp>
+      <p:sp>
+        <p:nvSpPr>
+          <p:cNvPr id="32" name="TextBox 31"/>
+          <p:cNvSpPr txBox="1"/>
+          <p:nvPr/>
+        </p:nvSpPr>
+        <p:spPr>
+          <a:xfrm>
+            <a:off x="1163355" y="5229440"/>
+            <a:ext cx="1409634" cy="307777"/>
+          </a:xfrm>
+          <a:prstGeom prst="rect">
+            <a:avLst/>
+          </a:prstGeom>
+          <a:noFill/>
+          <a:effectLst>
+            <a:softEdge rad="25400"/>
+          </a:effectLst>
+        </p:spPr>
+        <p:txBody>
+          <a:bodyPr wrap="square" rtlCol="0">
+            <a:spAutoFit/>
+          </a:bodyPr>
+          <a:lstStyle/>
+          <a:p>
+            <a:pPr algn="r"/>
+            <a:r>
+              <a:rPr lang="en-US" sz="1400" b="1" dirty="0" smtClean="0">
+                <a:latin typeface="Segoe UI" panose="020B0502040204020203" pitchFamily="34" charset="0"/>
+                <a:cs typeface="Segoe UI" panose="020B0502040204020203" pitchFamily="34" charset="0"/>
+              </a:rPr>
+              <a:t>UMSCENT</a:t>
+            </a:r>
+            <a:endParaRPr lang="en-US" sz="1400" b="1" dirty="0">
+              <a:latin typeface="Segoe UI" panose="020B0502040204020203" pitchFamily="34" charset="0"/>
+              <a:cs typeface="Segoe UI" panose="020B0502040204020203" pitchFamily="34" charset="0"/>
+            </a:endParaRPr>
+          </a:p>
+        </p:txBody>
+      </p:sp>
+      <p:sp>
+        <p:nvSpPr>
+          <p:cNvPr id="34" name="TextBox 33"/>
+          <p:cNvSpPr txBox="1"/>
+          <p:nvPr/>
+        </p:nvSpPr>
+        <p:spPr>
+          <a:xfrm>
+            <a:off x="1339009" y="5717006"/>
+            <a:ext cx="1233979" cy="307777"/>
+          </a:xfrm>
+          <a:prstGeom prst="rect">
+            <a:avLst/>
+          </a:prstGeom>
+          <a:noFill/>
+          <a:effectLst>
+            <a:softEdge rad="25400"/>
+          </a:effectLst>
+        </p:spPr>
+        <p:txBody>
+          <a:bodyPr wrap="square" rtlCol="0">
+            <a:spAutoFit/>
+          </a:bodyPr>
+          <a:lstStyle/>
+          <a:p>
+            <a:pPr algn="r"/>
+            <a:r>
+              <a:rPr lang="en-US" sz="1400" b="1" dirty="0" smtClean="0">
+                <a:latin typeface="Segoe UI" panose="020B0502040204020203" pitchFamily="34" charset="0"/>
+                <a:cs typeface="Segoe UI" panose="020B0502040204020203" pitchFamily="34" charset="0"/>
+              </a:rPr>
+              <a:t>USSLIND</a:t>
+            </a:r>
+            <a:endParaRPr lang="en-US" sz="1400" b="1" dirty="0">
+              <a:latin typeface="Segoe UI" panose="020B0502040204020203" pitchFamily="34" charset="0"/>
+              <a:cs typeface="Segoe UI" panose="020B0502040204020203" pitchFamily="34" charset="0"/>
+            </a:endParaRPr>
+          </a:p>
+        </p:txBody>
+      </p:sp>
+      <p:sp>
+        <p:nvSpPr>
+          <p:cNvPr id="35" name="Oval 34"/>
+          <p:cNvSpPr/>
+          <p:nvPr/>
+        </p:nvSpPr>
+        <p:spPr>
+          <a:xfrm>
+            <a:off x="2710148" y="2691190"/>
+            <a:ext cx="426720" cy="419131"/>
+          </a:xfrm>
+          <a:prstGeom prst="ellipse">
+            <a:avLst/>
+          </a:prstGeom>
+          <a:solidFill>
+            <a:schemeClr val="accent1">
+              <a:lumMod val="60000"/>
+              <a:lumOff val="40000"/>
+            </a:schemeClr>
+          </a:solidFill>
+          <a:ln w="50800"/>
+          <a:effectLst>
+            <a:outerShdw blurRad="50800" dist="38100" dir="8100000" algn="tr" rotWithShape="0">
+              <a:prstClr val="black">
+                <a:alpha val="40000"/>
+              </a:prstClr>
+            </a:outerShdw>
+          </a:effectLst>
+        </p:spPr>
+        <p:style>
+          <a:lnRef idx="2">
+            <a:schemeClr val="accent1">
+              <a:shade val="50000"/>
+            </a:schemeClr>
+          </a:lnRef>
+          <a:fillRef idx="1">
+            <a:schemeClr val="accent1"/>
+          </a:fillRef>
+          <a:effectRef idx="0">
+            <a:schemeClr val="accent1"/>
+          </a:effectRef>
+          <a:fontRef idx="minor">
+            <a:schemeClr val="lt1"/>
+          </a:fontRef>
+        </p:style>
+        <p:txBody>
+          <a:bodyPr rtlCol="0" anchor="ctr"/>
+          <a:lstStyle/>
+          <a:p>
+            <a:pPr algn="ctr"/>
+            <a:endParaRPr lang="en-US"/>
+          </a:p>
+        </p:txBody>
+      </p:sp>
+      <p:sp>
+        <p:nvSpPr>
+          <p:cNvPr id="36" name="Oval 35"/>
+          <p:cNvSpPr/>
+          <p:nvPr/>
+        </p:nvSpPr>
+        <p:spPr>
+          <a:xfrm>
+            <a:off x="2710148" y="3187466"/>
+            <a:ext cx="426720" cy="419131"/>
+          </a:xfrm>
+          <a:prstGeom prst="ellipse">
+            <a:avLst/>
+          </a:prstGeom>
+          <a:solidFill>
+            <a:schemeClr val="accent1">
+              <a:lumMod val="60000"/>
+              <a:lumOff val="40000"/>
+            </a:schemeClr>
+          </a:solidFill>
+          <a:ln w="50800"/>
+          <a:effectLst>
+            <a:outerShdw blurRad="50800" dist="38100" dir="8100000" algn="tr" rotWithShape="0">
+              <a:prstClr val="black">
+                <a:alpha val="40000"/>
+              </a:prstClr>
+            </a:outerShdw>
+          </a:effectLst>
+        </p:spPr>
+        <p:style>
+          <a:lnRef idx="2">
+            <a:schemeClr val="accent1">
+              <a:shade val="50000"/>
+            </a:schemeClr>
+          </a:lnRef>
+          <a:fillRef idx="1">
+            <a:schemeClr val="accent1"/>
+          </a:fillRef>
+          <a:effectRef idx="0">
+            <a:schemeClr val="accent1"/>
+          </a:effectRef>
+          <a:fontRef idx="minor">
+            <a:schemeClr val="lt1"/>
+          </a:fontRef>
+        </p:style>
+        <p:txBody>
+          <a:bodyPr rtlCol="0" anchor="ctr"/>
+          <a:lstStyle/>
+          <a:p>
+            <a:pPr algn="ctr"/>
+            <a:endParaRPr lang="en-US"/>
+          </a:p>
+        </p:txBody>
+      </p:sp>
+      <p:sp>
+        <p:nvSpPr>
+          <p:cNvPr id="37" name="Oval 36"/>
+          <p:cNvSpPr/>
+          <p:nvPr/>
+        </p:nvSpPr>
+        <p:spPr>
+          <a:xfrm>
+            <a:off x="2710148" y="3683742"/>
+            <a:ext cx="426720" cy="419131"/>
+          </a:xfrm>
+          <a:prstGeom prst="ellipse">
+            <a:avLst/>
+          </a:prstGeom>
+          <a:solidFill>
+            <a:schemeClr val="accent1">
+              <a:lumMod val="60000"/>
+              <a:lumOff val="40000"/>
+            </a:schemeClr>
+          </a:solidFill>
+          <a:ln w="50800"/>
+          <a:effectLst>
+            <a:outerShdw blurRad="50800" dist="38100" dir="8100000" algn="tr" rotWithShape="0">
+              <a:prstClr val="black">
+                <a:alpha val="40000"/>
+              </a:prstClr>
+            </a:outerShdw>
+          </a:effectLst>
+        </p:spPr>
+        <p:style>
+          <a:lnRef idx="2">
+            <a:schemeClr val="accent1">
+              <a:shade val="50000"/>
+            </a:schemeClr>
+          </a:lnRef>
+          <a:fillRef idx="1">
+            <a:schemeClr val="accent1"/>
+          </a:fillRef>
+          <a:effectRef idx="0">
+            <a:schemeClr val="accent1"/>
+          </a:effectRef>
+          <a:fontRef idx="minor">
+            <a:schemeClr val="lt1"/>
+          </a:fontRef>
+        </p:style>
+        <p:txBody>
+          <a:bodyPr rtlCol="0" anchor="ctr"/>
+          <a:lstStyle/>
+          <a:p>
+            <a:pPr algn="ctr"/>
+            <a:endParaRPr lang="en-US"/>
+          </a:p>
+        </p:txBody>
+      </p:sp>
+      <p:sp>
+        <p:nvSpPr>
+          <p:cNvPr id="38" name="Oval 37"/>
+          <p:cNvSpPr/>
+          <p:nvPr/>
+        </p:nvSpPr>
+        <p:spPr>
+          <a:xfrm>
+            <a:off x="2710148" y="4176260"/>
+            <a:ext cx="426720" cy="419131"/>
+          </a:xfrm>
+          <a:prstGeom prst="ellipse">
+            <a:avLst/>
+          </a:prstGeom>
+          <a:solidFill>
+            <a:schemeClr val="accent1">
+              <a:lumMod val="60000"/>
+              <a:lumOff val="40000"/>
+            </a:schemeClr>
+          </a:solidFill>
+          <a:ln w="50800"/>
+          <a:effectLst>
+            <a:outerShdw blurRad="50800" dist="38100" dir="8100000" algn="tr" rotWithShape="0">
+              <a:prstClr val="black">
+                <a:alpha val="40000"/>
+              </a:prstClr>
+            </a:outerShdw>
+          </a:effectLst>
+        </p:spPr>
+        <p:style>
+          <a:lnRef idx="2">
+            <a:schemeClr val="accent1">
+              <a:shade val="50000"/>
+            </a:schemeClr>
+          </a:lnRef>
+          <a:fillRef idx="1">
+            <a:schemeClr val="accent1"/>
+          </a:fillRef>
+          <a:effectRef idx="0">
+            <a:schemeClr val="accent1"/>
+          </a:effectRef>
+          <a:fontRef idx="minor">
+            <a:schemeClr val="lt1"/>
+          </a:fontRef>
+        </p:style>
+        <p:txBody>
+          <a:bodyPr rtlCol="0" anchor="ctr"/>
+          <a:lstStyle/>
+          <a:p>
+            <a:pPr algn="ctr"/>
+            <a:endParaRPr lang="en-US"/>
+          </a:p>
+        </p:txBody>
+      </p:sp>
+      <p:sp>
+        <p:nvSpPr>
+          <p:cNvPr id="39" name="Oval 38"/>
+          <p:cNvSpPr/>
+          <p:nvPr/>
+        </p:nvSpPr>
+        <p:spPr>
+          <a:xfrm>
+            <a:off x="2710148" y="4672536"/>
+            <a:ext cx="426720" cy="419131"/>
+          </a:xfrm>
+          <a:prstGeom prst="ellipse">
+            <a:avLst/>
+          </a:prstGeom>
+          <a:solidFill>
+            <a:schemeClr val="accent1">
+              <a:lumMod val="60000"/>
+              <a:lumOff val="40000"/>
+            </a:schemeClr>
+          </a:solidFill>
+          <a:ln w="50800"/>
+          <a:effectLst>
+            <a:outerShdw blurRad="50800" dist="38100" dir="8100000" algn="tr" rotWithShape="0">
+              <a:prstClr val="black">
+                <a:alpha val="40000"/>
+              </a:prstClr>
+            </a:outerShdw>
+          </a:effectLst>
+        </p:spPr>
+        <p:style>
+          <a:lnRef idx="2">
+            <a:schemeClr val="accent1">
+              <a:shade val="50000"/>
+            </a:schemeClr>
+          </a:lnRef>
+          <a:fillRef idx="1">
+            <a:schemeClr val="accent1"/>
+          </a:fillRef>
+          <a:effectRef idx="0">
+            <a:schemeClr val="accent1"/>
+          </a:effectRef>
+          <a:fontRef idx="minor">
+            <a:schemeClr val="lt1"/>
+          </a:fontRef>
+        </p:style>
+        <p:txBody>
+          <a:bodyPr rtlCol="0" anchor="ctr"/>
+          <a:lstStyle/>
+          <a:p>
+            <a:pPr algn="ctr"/>
+            <a:endParaRPr lang="en-US"/>
+          </a:p>
+        </p:txBody>
+      </p:sp>
+      <p:sp>
+        <p:nvSpPr>
+          <p:cNvPr id="40" name="Oval 39"/>
+          <p:cNvSpPr/>
+          <p:nvPr/>
+        </p:nvSpPr>
+        <p:spPr>
+          <a:xfrm>
+            <a:off x="2710148" y="5168812"/>
+            <a:ext cx="426720" cy="419131"/>
+          </a:xfrm>
+          <a:prstGeom prst="ellipse">
+            <a:avLst/>
+          </a:prstGeom>
+          <a:solidFill>
+            <a:schemeClr val="accent1">
+              <a:lumMod val="60000"/>
+              <a:lumOff val="40000"/>
+            </a:schemeClr>
+          </a:solidFill>
+          <a:ln w="50800"/>
+          <a:effectLst>
+            <a:outerShdw blurRad="50800" dist="38100" dir="8100000" algn="tr" rotWithShape="0">
+              <a:prstClr val="black">
+                <a:alpha val="40000"/>
+              </a:prstClr>
+            </a:outerShdw>
+          </a:effectLst>
+        </p:spPr>
+        <p:style>
+          <a:lnRef idx="2">
+            <a:schemeClr val="accent1">
+              <a:shade val="50000"/>
+            </a:schemeClr>
+          </a:lnRef>
+          <a:fillRef idx="1">
+            <a:schemeClr val="accent1"/>
+          </a:fillRef>
+          <a:effectRef idx="0">
+            <a:schemeClr val="accent1"/>
+          </a:effectRef>
+          <a:fontRef idx="minor">
+            <a:schemeClr val="lt1"/>
+          </a:fontRef>
+        </p:style>
+        <p:txBody>
+          <a:bodyPr rtlCol="0" anchor="ctr"/>
+          <a:lstStyle/>
+          <a:p>
+            <a:pPr algn="ctr"/>
+            <a:endParaRPr lang="en-US"/>
+          </a:p>
+        </p:txBody>
+      </p:sp>
+      <p:sp>
+        <p:nvSpPr>
+          <p:cNvPr id="41" name="Oval 40"/>
+          <p:cNvSpPr/>
+          <p:nvPr/>
+        </p:nvSpPr>
+        <p:spPr>
+          <a:xfrm>
+            <a:off x="2710148" y="5665088"/>
+            <a:ext cx="426720" cy="419131"/>
+          </a:xfrm>
+          <a:prstGeom prst="ellipse">
+            <a:avLst/>
+          </a:prstGeom>
+          <a:solidFill>
+            <a:schemeClr val="accent1">
+              <a:lumMod val="60000"/>
+              <a:lumOff val="40000"/>
+            </a:schemeClr>
+          </a:solidFill>
+          <a:ln w="50800"/>
+          <a:effectLst>
+            <a:outerShdw blurRad="50800" dist="38100" dir="8100000" algn="tr" rotWithShape="0">
+              <a:prstClr val="black">
+                <a:alpha val="40000"/>
+              </a:prstClr>
+            </a:outerShdw>
+          </a:effectLst>
+        </p:spPr>
+        <p:style>
+          <a:lnRef idx="2">
+            <a:schemeClr val="accent1">
+              <a:shade val="50000"/>
+            </a:schemeClr>
+          </a:lnRef>
+          <a:fillRef idx="1">
+            <a:schemeClr val="accent1"/>
+          </a:fillRef>
+          <a:effectRef idx="0">
+            <a:schemeClr val="accent1"/>
+          </a:effectRef>
+          <a:fontRef idx="minor">
+            <a:schemeClr val="lt1"/>
+          </a:fontRef>
+        </p:style>
+        <p:txBody>
+          <a:bodyPr rtlCol="0" anchor="ctr"/>
+          <a:lstStyle/>
+          <a:p>
+            <a:pPr algn="ctr"/>
+            <a:endParaRPr lang="en-US"/>
+          </a:p>
+        </p:txBody>
+      </p:sp>
+      <p:sp>
+        <p:nvSpPr>
+          <p:cNvPr id="42" name="Oval 41"/>
+          <p:cNvSpPr/>
+          <p:nvPr/>
+        </p:nvSpPr>
+        <p:spPr>
+          <a:xfrm>
+            <a:off x="5612439" y="673271"/>
+            <a:ext cx="220513" cy="227691"/>
+          </a:xfrm>
+          <a:prstGeom prst="ellipse">
+            <a:avLst/>
+          </a:prstGeom>
+          <a:solidFill>
+            <a:schemeClr val="accent1">
+              <a:lumMod val="60000"/>
+              <a:lumOff val="40000"/>
+            </a:schemeClr>
+          </a:solidFill>
+          <a:ln w="50800"/>
+          <a:effectLst>
+            <a:outerShdw blurRad="50800" dist="38100" dir="8100000" algn="tr" rotWithShape="0">
+              <a:prstClr val="black">
+                <a:alpha val="40000"/>
+              </a:prstClr>
+            </a:outerShdw>
+          </a:effectLst>
+        </p:spPr>
+        <p:style>
+          <a:lnRef idx="2">
+            <a:schemeClr val="accent1">
+              <a:shade val="50000"/>
+            </a:schemeClr>
+          </a:lnRef>
+          <a:fillRef idx="1">
+            <a:schemeClr val="accent1"/>
+          </a:fillRef>
+          <a:effectRef idx="0">
+            <a:schemeClr val="accent1"/>
+          </a:effectRef>
+          <a:fontRef idx="minor">
+            <a:schemeClr val="lt1"/>
+          </a:fontRef>
+        </p:style>
+        <p:txBody>
+          <a:bodyPr rtlCol="0" anchor="ctr"/>
+          <a:lstStyle/>
+          <a:p>
+            <a:pPr algn="ctr"/>
+            <a:endParaRPr lang="en-US"/>
+          </a:p>
+        </p:txBody>
+      </p:sp>
+      <p:sp>
+        <p:nvSpPr>
+          <p:cNvPr id="43" name="Oval 42"/>
+          <p:cNvSpPr/>
+          <p:nvPr/>
+        </p:nvSpPr>
+        <p:spPr>
+          <a:xfrm>
+            <a:off x="5612439" y="978556"/>
+            <a:ext cx="220513" cy="227691"/>
+          </a:xfrm>
+          <a:prstGeom prst="ellipse">
+            <a:avLst/>
+          </a:prstGeom>
+          <a:solidFill>
+            <a:schemeClr val="accent1">
+              <a:lumMod val="60000"/>
+              <a:lumOff val="40000"/>
+            </a:schemeClr>
+          </a:solidFill>
+          <a:ln w="50800"/>
+          <a:effectLst>
+            <a:outerShdw blurRad="50800" dist="38100" dir="8100000" algn="tr" rotWithShape="0">
+              <a:prstClr val="black">
+                <a:alpha val="40000"/>
+              </a:prstClr>
+            </a:outerShdw>
+          </a:effectLst>
+        </p:spPr>
+        <p:style>
+          <a:lnRef idx="2">
+            <a:schemeClr val="accent1">
+              <a:shade val="50000"/>
+            </a:schemeClr>
+          </a:lnRef>
+          <a:fillRef idx="1">
+            <a:schemeClr val="accent1"/>
+          </a:fillRef>
+          <a:effectRef idx="0">
+            <a:schemeClr val="accent1"/>
+          </a:effectRef>
+          <a:fontRef idx="minor">
+            <a:schemeClr val="lt1"/>
+          </a:fontRef>
+        </p:style>
+        <p:txBody>
+          <a:bodyPr rtlCol="0" anchor="ctr"/>
+          <a:lstStyle/>
+          <a:p>
+            <a:pPr algn="ctr"/>
+            <a:endParaRPr lang="en-US"/>
+          </a:p>
+        </p:txBody>
+      </p:sp>
+      <p:sp>
+        <p:nvSpPr>
+          <p:cNvPr id="44" name="Oval 43"/>
+          <p:cNvSpPr/>
+          <p:nvPr/>
+        </p:nvSpPr>
+        <p:spPr>
+          <a:xfrm>
+            <a:off x="5612439" y="1288686"/>
+            <a:ext cx="220513" cy="227691"/>
+          </a:xfrm>
+          <a:prstGeom prst="ellipse">
+            <a:avLst/>
+          </a:prstGeom>
+          <a:solidFill>
+            <a:schemeClr val="accent1">
+              <a:lumMod val="60000"/>
+              <a:lumOff val="40000"/>
+            </a:schemeClr>
+          </a:solidFill>
+          <a:ln w="50800"/>
+          <a:effectLst>
+            <a:outerShdw blurRad="50800" dist="38100" dir="8100000" algn="tr" rotWithShape="0">
+              <a:prstClr val="black">
+                <a:alpha val="40000"/>
+              </a:prstClr>
+            </a:outerShdw>
+          </a:effectLst>
+        </p:spPr>
+        <p:style>
+          <a:lnRef idx="2">
+            <a:schemeClr val="accent1">
+              <a:shade val="50000"/>
+            </a:schemeClr>
+          </a:lnRef>
+          <a:fillRef idx="1">
+            <a:schemeClr val="accent1"/>
+          </a:fillRef>
+          <a:effectRef idx="0">
+            <a:schemeClr val="accent1"/>
+          </a:effectRef>
+          <a:fontRef idx="minor">
+            <a:schemeClr val="lt1"/>
+          </a:fontRef>
+        </p:style>
+        <p:txBody>
+          <a:bodyPr rtlCol="0" anchor="ctr"/>
+          <a:lstStyle/>
+          <a:p>
+            <a:pPr algn="ctr"/>
+            <a:endParaRPr lang="en-US"/>
+          </a:p>
+        </p:txBody>
+      </p:sp>
+      <p:sp>
+        <p:nvSpPr>
+          <p:cNvPr id="45" name="Oval 44"/>
+          <p:cNvSpPr/>
+          <p:nvPr/>
+        </p:nvSpPr>
+        <p:spPr>
+          <a:xfrm>
+            <a:off x="5612439" y="1593971"/>
+            <a:ext cx="220513" cy="227691"/>
+          </a:xfrm>
+          <a:prstGeom prst="ellipse">
+            <a:avLst/>
+          </a:prstGeom>
+          <a:solidFill>
+            <a:schemeClr val="accent1">
+              <a:lumMod val="60000"/>
+              <a:lumOff val="40000"/>
+            </a:schemeClr>
+          </a:solidFill>
+          <a:ln w="50800"/>
+          <a:effectLst>
+            <a:outerShdw blurRad="50800" dist="38100" dir="8100000" algn="tr" rotWithShape="0">
+              <a:prstClr val="black">
+                <a:alpha val="40000"/>
+              </a:prstClr>
+            </a:outerShdw>
+          </a:effectLst>
+        </p:spPr>
+        <p:style>
+          <a:lnRef idx="2">
+            <a:schemeClr val="accent1">
+              <a:shade val="50000"/>
+            </a:schemeClr>
+          </a:lnRef>
+          <a:fillRef idx="1">
+            <a:schemeClr val="accent1"/>
+          </a:fillRef>
+          <a:effectRef idx="0">
+            <a:schemeClr val="accent1"/>
+          </a:effectRef>
+          <a:fontRef idx="minor">
+            <a:schemeClr val="lt1"/>
+          </a:fontRef>
+        </p:style>
+        <p:txBody>
+          <a:bodyPr rtlCol="0" anchor="ctr"/>
+          <a:lstStyle/>
+          <a:p>
+            <a:pPr algn="ctr"/>
+            <a:endParaRPr lang="en-US"/>
+          </a:p>
+        </p:txBody>
+      </p:sp>
+      <p:sp>
+        <p:nvSpPr>
+          <p:cNvPr id="46" name="Oval 45"/>
+          <p:cNvSpPr/>
+          <p:nvPr/>
+        </p:nvSpPr>
+        <p:spPr>
+          <a:xfrm>
+            <a:off x="5612439" y="1905556"/>
+            <a:ext cx="220513" cy="227691"/>
+          </a:xfrm>
+          <a:prstGeom prst="ellipse">
+            <a:avLst/>
+          </a:prstGeom>
+          <a:solidFill>
+            <a:schemeClr val="accent1">
+              <a:lumMod val="60000"/>
+              <a:lumOff val="40000"/>
+            </a:schemeClr>
+          </a:solidFill>
+          <a:ln w="50800"/>
+          <a:effectLst>
+            <a:outerShdw blurRad="50800" dist="38100" dir="8100000" algn="tr" rotWithShape="0">
+              <a:prstClr val="black">
+                <a:alpha val="40000"/>
+              </a:prstClr>
+            </a:outerShdw>
+          </a:effectLst>
+        </p:spPr>
+        <p:style>
+          <a:lnRef idx="2">
+            <a:schemeClr val="accent1">
+              <a:shade val="50000"/>
+            </a:schemeClr>
+          </a:lnRef>
+          <a:fillRef idx="1">
+            <a:schemeClr val="accent1"/>
+          </a:fillRef>
+          <a:effectRef idx="0">
+            <a:schemeClr val="accent1"/>
+          </a:effectRef>
+          <a:fontRef idx="minor">
+            <a:schemeClr val="lt1"/>
+          </a:fontRef>
+        </p:style>
+        <p:txBody>
+          <a:bodyPr rtlCol="0" anchor="ctr"/>
+          <a:lstStyle/>
+          <a:p>
+            <a:pPr algn="ctr"/>
+            <a:endParaRPr lang="en-US"/>
+          </a:p>
+        </p:txBody>
+      </p:sp>
+      <p:sp>
+        <p:nvSpPr>
+          <p:cNvPr id="47" name="Oval 46"/>
+          <p:cNvSpPr/>
+          <p:nvPr/>
+        </p:nvSpPr>
+        <p:spPr>
+          <a:xfrm>
+            <a:off x="5612439" y="2210841"/>
+            <a:ext cx="220513" cy="227691"/>
+          </a:xfrm>
+          <a:prstGeom prst="ellipse">
+            <a:avLst/>
+          </a:prstGeom>
+          <a:solidFill>
+            <a:schemeClr val="accent1">
+              <a:lumMod val="60000"/>
+              <a:lumOff val="40000"/>
+            </a:schemeClr>
+          </a:solidFill>
+          <a:ln w="50800"/>
+          <a:effectLst>
+            <a:outerShdw blurRad="50800" dist="38100" dir="8100000" algn="tr" rotWithShape="0">
+              <a:prstClr val="black">
+                <a:alpha val="40000"/>
+              </a:prstClr>
+            </a:outerShdw>
+          </a:effectLst>
+        </p:spPr>
+        <p:style>
+          <a:lnRef idx="2">
+            <a:schemeClr val="accent1">
+              <a:shade val="50000"/>
+            </a:schemeClr>
+          </a:lnRef>
+          <a:fillRef idx="1">
+            <a:schemeClr val="accent1"/>
+          </a:fillRef>
+          <a:effectRef idx="0">
+            <a:schemeClr val="accent1"/>
+          </a:effectRef>
+          <a:fontRef idx="minor">
+            <a:schemeClr val="lt1"/>
+          </a:fontRef>
+        </p:style>
+        <p:txBody>
+          <a:bodyPr rtlCol="0" anchor="ctr"/>
+          <a:lstStyle/>
+          <a:p>
+            <a:pPr algn="ctr"/>
+            <a:endParaRPr lang="en-US"/>
+          </a:p>
+        </p:txBody>
+      </p:sp>
+      <p:sp>
+        <p:nvSpPr>
+          <p:cNvPr id="48" name="Oval 47"/>
+          <p:cNvSpPr/>
+          <p:nvPr/>
+        </p:nvSpPr>
+        <p:spPr>
+          <a:xfrm>
+            <a:off x="5612439" y="2520971"/>
+            <a:ext cx="220513" cy="227691"/>
+          </a:xfrm>
+          <a:prstGeom prst="ellipse">
+            <a:avLst/>
+          </a:prstGeom>
+          <a:solidFill>
+            <a:schemeClr val="accent1">
+              <a:lumMod val="60000"/>
+              <a:lumOff val="40000"/>
+            </a:schemeClr>
+          </a:solidFill>
+          <a:ln w="50800"/>
+          <a:effectLst>
+            <a:outerShdw blurRad="50800" dist="38100" dir="8100000" algn="tr" rotWithShape="0">
+              <a:prstClr val="black">
+                <a:alpha val="40000"/>
+              </a:prstClr>
+            </a:outerShdw>
+          </a:effectLst>
+        </p:spPr>
+        <p:style>
+          <a:lnRef idx="2">
+            <a:schemeClr val="accent1">
+              <a:shade val="50000"/>
+            </a:schemeClr>
+          </a:lnRef>
+          <a:fillRef idx="1">
+            <a:schemeClr val="accent1"/>
+          </a:fillRef>
+          <a:effectRef idx="0">
+            <a:schemeClr val="accent1"/>
+          </a:effectRef>
+          <a:fontRef idx="minor">
+            <a:schemeClr val="lt1"/>
+          </a:fontRef>
+        </p:style>
+        <p:txBody>
+          <a:bodyPr rtlCol="0" anchor="ctr"/>
+          <a:lstStyle/>
+          <a:p>
+            <a:pPr algn="ctr"/>
+            <a:endParaRPr lang="en-US"/>
+          </a:p>
+        </p:txBody>
+      </p:sp>
+      <p:sp>
+        <p:nvSpPr>
+          <p:cNvPr id="49" name="Oval 48"/>
+          <p:cNvSpPr/>
+          <p:nvPr/>
+        </p:nvSpPr>
+        <p:spPr>
+          <a:xfrm>
+            <a:off x="5612439" y="2826256"/>
+            <a:ext cx="220513" cy="227691"/>
+          </a:xfrm>
+          <a:prstGeom prst="ellipse">
+            <a:avLst/>
+          </a:prstGeom>
+          <a:solidFill>
+            <a:schemeClr val="accent1">
+              <a:lumMod val="60000"/>
+              <a:lumOff val="40000"/>
+            </a:schemeClr>
+          </a:solidFill>
+          <a:ln w="50800"/>
+          <a:effectLst>
+            <a:outerShdw blurRad="50800" dist="38100" dir="8100000" algn="tr" rotWithShape="0">
+              <a:prstClr val="black">
+                <a:alpha val="40000"/>
+              </a:prstClr>
+            </a:outerShdw>
+          </a:effectLst>
+        </p:spPr>
+        <p:style>
+          <a:lnRef idx="2">
+            <a:schemeClr val="accent1">
+              <a:shade val="50000"/>
+            </a:schemeClr>
+          </a:lnRef>
+          <a:fillRef idx="1">
+            <a:schemeClr val="accent1"/>
+          </a:fillRef>
+          <a:effectRef idx="0">
+            <a:schemeClr val="accent1"/>
+          </a:effectRef>
+          <a:fontRef idx="minor">
+            <a:schemeClr val="lt1"/>
+          </a:fontRef>
+        </p:style>
+        <p:txBody>
+          <a:bodyPr rtlCol="0" anchor="ctr"/>
+          <a:lstStyle/>
+          <a:p>
+            <a:pPr algn="ctr"/>
+            <a:endParaRPr lang="en-US"/>
+          </a:p>
+        </p:txBody>
+      </p:sp>
+      <p:sp>
+        <p:nvSpPr>
+          <p:cNvPr id="50" name="Oval 49"/>
+          <p:cNvSpPr/>
+          <p:nvPr/>
+        </p:nvSpPr>
+        <p:spPr>
+          <a:xfrm>
+            <a:off x="5606465" y="3141912"/>
+            <a:ext cx="220513" cy="227691"/>
+          </a:xfrm>
+          <a:prstGeom prst="ellipse">
+            <a:avLst/>
+          </a:prstGeom>
+          <a:solidFill>
+            <a:schemeClr val="accent1">
+              <a:lumMod val="60000"/>
+              <a:lumOff val="40000"/>
+            </a:schemeClr>
+          </a:solidFill>
+          <a:ln w="50800"/>
+          <a:effectLst>
+            <a:outerShdw blurRad="50800" dist="38100" dir="8100000" algn="tr" rotWithShape="0">
+              <a:prstClr val="black">
+                <a:alpha val="40000"/>
+              </a:prstClr>
+            </a:outerShdw>
+          </a:effectLst>
+        </p:spPr>
+        <p:style>
+          <a:lnRef idx="2">
+            <a:schemeClr val="accent1">
+              <a:shade val="50000"/>
+            </a:schemeClr>
+          </a:lnRef>
+          <a:fillRef idx="1">
+            <a:schemeClr val="accent1"/>
+          </a:fillRef>
+          <a:effectRef idx="0">
+            <a:schemeClr val="accent1"/>
+          </a:effectRef>
+          <a:fontRef idx="minor">
+            <a:schemeClr val="lt1"/>
+          </a:fontRef>
+        </p:style>
+        <p:txBody>
+          <a:bodyPr rtlCol="0" anchor="ctr"/>
+          <a:lstStyle/>
+          <a:p>
+            <a:pPr algn="ctr"/>
+            <a:endParaRPr lang="en-US"/>
+          </a:p>
+        </p:txBody>
+      </p:sp>
+      <p:sp>
+        <p:nvSpPr>
+          <p:cNvPr id="51" name="Oval 50"/>
+          <p:cNvSpPr/>
+          <p:nvPr/>
+        </p:nvSpPr>
+        <p:spPr>
+          <a:xfrm>
+            <a:off x="5606465" y="3447197"/>
+            <a:ext cx="220513" cy="227691"/>
+          </a:xfrm>
+          <a:prstGeom prst="ellipse">
+            <a:avLst/>
+          </a:prstGeom>
+          <a:solidFill>
+            <a:schemeClr val="accent1">
+              <a:lumMod val="60000"/>
+              <a:lumOff val="40000"/>
+            </a:schemeClr>
+          </a:solidFill>
+          <a:ln w="50800"/>
+          <a:effectLst>
+            <a:outerShdw blurRad="50800" dist="38100" dir="8100000" algn="tr" rotWithShape="0">
+              <a:prstClr val="black">
+                <a:alpha val="40000"/>
+              </a:prstClr>
+            </a:outerShdw>
+          </a:effectLst>
+        </p:spPr>
+        <p:style>
+          <a:lnRef idx="2">
+            <a:schemeClr val="accent1">
+              <a:shade val="50000"/>
+            </a:schemeClr>
+          </a:lnRef>
+          <a:fillRef idx="1">
+            <a:schemeClr val="accent1"/>
+          </a:fillRef>
+          <a:effectRef idx="0">
+            <a:schemeClr val="accent1"/>
+          </a:effectRef>
+          <a:fontRef idx="minor">
+            <a:schemeClr val="lt1"/>
+          </a:fontRef>
+        </p:style>
+        <p:txBody>
+          <a:bodyPr rtlCol="0" anchor="ctr"/>
+          <a:lstStyle/>
+          <a:p>
+            <a:pPr algn="ctr"/>
+            <a:endParaRPr lang="en-US"/>
+          </a:p>
+        </p:txBody>
+      </p:sp>
+      <p:sp>
+        <p:nvSpPr>
+          <p:cNvPr id="52" name="Oval 51"/>
+          <p:cNvSpPr/>
+          <p:nvPr/>
+        </p:nvSpPr>
+        <p:spPr>
+          <a:xfrm>
+            <a:off x="5606465" y="3757327"/>
+            <a:ext cx="220513" cy="227691"/>
+          </a:xfrm>
+          <a:prstGeom prst="ellipse">
+            <a:avLst/>
+          </a:prstGeom>
+          <a:solidFill>
+            <a:schemeClr val="accent1">
+              <a:lumMod val="60000"/>
+              <a:lumOff val="40000"/>
+            </a:schemeClr>
+          </a:solidFill>
+          <a:ln w="50800"/>
+          <a:effectLst>
+            <a:outerShdw blurRad="50800" dist="38100" dir="8100000" algn="tr" rotWithShape="0">
+              <a:prstClr val="black">
+                <a:alpha val="40000"/>
+              </a:prstClr>
+            </a:outerShdw>
+          </a:effectLst>
+        </p:spPr>
+        <p:style>
+          <a:lnRef idx="2">
+            <a:schemeClr val="accent1">
+              <a:shade val="50000"/>
+            </a:schemeClr>
+          </a:lnRef>
+          <a:fillRef idx="1">
+            <a:schemeClr val="accent1"/>
+          </a:fillRef>
+          <a:effectRef idx="0">
+            <a:schemeClr val="accent1"/>
+          </a:effectRef>
+          <a:fontRef idx="minor">
+            <a:schemeClr val="lt1"/>
+          </a:fontRef>
+        </p:style>
+        <p:txBody>
+          <a:bodyPr rtlCol="0" anchor="ctr"/>
+          <a:lstStyle/>
+          <a:p>
+            <a:pPr algn="ctr"/>
+            <a:endParaRPr lang="en-US"/>
+          </a:p>
+        </p:txBody>
+      </p:sp>
+      <p:sp>
+        <p:nvSpPr>
+          <p:cNvPr id="53" name="Oval 52"/>
+          <p:cNvSpPr/>
+          <p:nvPr/>
+        </p:nvSpPr>
+        <p:spPr>
+          <a:xfrm>
+            <a:off x="5606465" y="4062612"/>
+            <a:ext cx="220513" cy="227691"/>
+          </a:xfrm>
+          <a:prstGeom prst="ellipse">
+            <a:avLst/>
+          </a:prstGeom>
+          <a:solidFill>
+            <a:schemeClr val="accent1">
+              <a:lumMod val="60000"/>
+              <a:lumOff val="40000"/>
+            </a:schemeClr>
+          </a:solidFill>
+          <a:ln w="50800"/>
+          <a:effectLst>
+            <a:outerShdw blurRad="50800" dist="38100" dir="8100000" algn="tr" rotWithShape="0">
+              <a:prstClr val="black">
+                <a:alpha val="40000"/>
+              </a:prstClr>
+            </a:outerShdw>
+          </a:effectLst>
+        </p:spPr>
+        <p:style>
+          <a:lnRef idx="2">
+            <a:schemeClr val="accent1">
+              <a:shade val="50000"/>
+            </a:schemeClr>
+          </a:lnRef>
+          <a:fillRef idx="1">
+            <a:schemeClr val="accent1"/>
+          </a:fillRef>
+          <a:effectRef idx="0">
+            <a:schemeClr val="accent1"/>
+          </a:effectRef>
+          <a:fontRef idx="minor">
+            <a:schemeClr val="lt1"/>
+          </a:fontRef>
+        </p:style>
+        <p:txBody>
+          <a:bodyPr rtlCol="0" anchor="ctr"/>
+          <a:lstStyle/>
+          <a:p>
+            <a:pPr algn="ctr"/>
+            <a:endParaRPr lang="en-US"/>
+          </a:p>
+        </p:txBody>
+      </p:sp>
+      <p:sp>
+        <p:nvSpPr>
+          <p:cNvPr id="54" name="Oval 53"/>
+          <p:cNvSpPr/>
+          <p:nvPr/>
+        </p:nvSpPr>
+        <p:spPr>
+          <a:xfrm>
+            <a:off x="5606465" y="4374197"/>
+            <a:ext cx="220513" cy="227691"/>
+          </a:xfrm>
+          <a:prstGeom prst="ellipse">
+            <a:avLst/>
+          </a:prstGeom>
+          <a:solidFill>
+            <a:schemeClr val="accent1">
+              <a:lumMod val="60000"/>
+              <a:lumOff val="40000"/>
+            </a:schemeClr>
+          </a:solidFill>
+          <a:ln w="50800"/>
+          <a:effectLst>
+            <a:outerShdw blurRad="50800" dist="38100" dir="8100000" algn="tr" rotWithShape="0">
+              <a:prstClr val="black">
+                <a:alpha val="40000"/>
+              </a:prstClr>
+            </a:outerShdw>
+          </a:effectLst>
+        </p:spPr>
+        <p:style>
+          <a:lnRef idx="2">
+            <a:schemeClr val="accent1">
+              <a:shade val="50000"/>
+            </a:schemeClr>
+          </a:lnRef>
+          <a:fillRef idx="1">
+            <a:schemeClr val="accent1"/>
+          </a:fillRef>
+          <a:effectRef idx="0">
+            <a:schemeClr val="accent1"/>
+          </a:effectRef>
+          <a:fontRef idx="minor">
+            <a:schemeClr val="lt1"/>
+          </a:fontRef>
+        </p:style>
+        <p:txBody>
+          <a:bodyPr rtlCol="0" anchor="ctr"/>
+          <a:lstStyle/>
+          <a:p>
+            <a:pPr algn="ctr"/>
+            <a:endParaRPr lang="en-US"/>
+          </a:p>
+        </p:txBody>
+      </p:sp>
+      <p:sp>
+        <p:nvSpPr>
+          <p:cNvPr id="55" name="Oval 54"/>
+          <p:cNvSpPr/>
+          <p:nvPr/>
+        </p:nvSpPr>
+        <p:spPr>
+          <a:xfrm>
+            <a:off x="5606465" y="4679482"/>
+            <a:ext cx="220513" cy="227691"/>
+          </a:xfrm>
+          <a:prstGeom prst="ellipse">
+            <a:avLst/>
+          </a:prstGeom>
+          <a:solidFill>
+            <a:schemeClr val="accent1">
+              <a:lumMod val="60000"/>
+              <a:lumOff val="40000"/>
+            </a:schemeClr>
+          </a:solidFill>
+          <a:ln w="50800"/>
+          <a:effectLst>
+            <a:outerShdw blurRad="50800" dist="38100" dir="8100000" algn="tr" rotWithShape="0">
+              <a:prstClr val="black">
+                <a:alpha val="40000"/>
+              </a:prstClr>
+            </a:outerShdw>
+          </a:effectLst>
+        </p:spPr>
+        <p:style>
+          <a:lnRef idx="2">
+            <a:schemeClr val="accent1">
+              <a:shade val="50000"/>
+            </a:schemeClr>
+          </a:lnRef>
+          <a:fillRef idx="1">
+            <a:schemeClr val="accent1"/>
+          </a:fillRef>
+          <a:effectRef idx="0">
+            <a:schemeClr val="accent1"/>
+          </a:effectRef>
+          <a:fontRef idx="minor">
+            <a:schemeClr val="lt1"/>
+          </a:fontRef>
+        </p:style>
+        <p:txBody>
+          <a:bodyPr rtlCol="0" anchor="ctr"/>
+          <a:lstStyle/>
+          <a:p>
+            <a:pPr algn="ctr"/>
+            <a:endParaRPr lang="en-US"/>
+          </a:p>
+        </p:txBody>
+      </p:sp>
+      <p:sp>
+        <p:nvSpPr>
+          <p:cNvPr id="56" name="Oval 55"/>
+          <p:cNvSpPr/>
+          <p:nvPr/>
+        </p:nvSpPr>
+        <p:spPr>
+          <a:xfrm>
+            <a:off x="5606465" y="4989612"/>
+            <a:ext cx="220513" cy="227691"/>
+          </a:xfrm>
+          <a:prstGeom prst="ellipse">
+            <a:avLst/>
+          </a:prstGeom>
+          <a:solidFill>
+            <a:schemeClr val="accent1">
+              <a:lumMod val="60000"/>
+              <a:lumOff val="40000"/>
+            </a:schemeClr>
+          </a:solidFill>
+          <a:ln w="50800"/>
+          <a:effectLst>
+            <a:outerShdw blurRad="50800" dist="38100" dir="8100000" algn="tr" rotWithShape="0">
+              <a:prstClr val="black">
+                <a:alpha val="40000"/>
+              </a:prstClr>
+            </a:outerShdw>
+          </a:effectLst>
+        </p:spPr>
+        <p:style>
+          <a:lnRef idx="2">
+            <a:schemeClr val="accent1">
+              <a:shade val="50000"/>
+            </a:schemeClr>
+          </a:lnRef>
+          <a:fillRef idx="1">
+            <a:schemeClr val="accent1"/>
+          </a:fillRef>
+          <a:effectRef idx="0">
+            <a:schemeClr val="accent1"/>
+          </a:effectRef>
+          <a:fontRef idx="minor">
+            <a:schemeClr val="lt1"/>
+          </a:fontRef>
+        </p:style>
+        <p:txBody>
+          <a:bodyPr rtlCol="0" anchor="ctr"/>
+          <a:lstStyle/>
+          <a:p>
+            <a:pPr algn="ctr"/>
+            <a:endParaRPr lang="en-US"/>
+          </a:p>
+        </p:txBody>
+      </p:sp>
+      <p:sp>
+        <p:nvSpPr>
+          <p:cNvPr id="57" name="Oval 56"/>
+          <p:cNvSpPr/>
+          <p:nvPr/>
+        </p:nvSpPr>
+        <p:spPr>
+          <a:xfrm>
+            <a:off x="5606465" y="5294897"/>
+            <a:ext cx="220513" cy="227691"/>
+          </a:xfrm>
+          <a:prstGeom prst="ellipse">
+            <a:avLst/>
+          </a:prstGeom>
+          <a:solidFill>
+            <a:schemeClr val="accent1">
+              <a:lumMod val="60000"/>
+              <a:lumOff val="40000"/>
+            </a:schemeClr>
+          </a:solidFill>
+          <a:ln w="50800"/>
+          <a:effectLst>
+            <a:outerShdw blurRad="50800" dist="38100" dir="8100000" algn="tr" rotWithShape="0">
+              <a:prstClr val="black">
+                <a:alpha val="40000"/>
+              </a:prstClr>
+            </a:outerShdw>
+          </a:effectLst>
+        </p:spPr>
+        <p:style>
+          <a:lnRef idx="2">
+            <a:schemeClr val="accent1">
+              <a:shade val="50000"/>
+            </a:schemeClr>
+          </a:lnRef>
+          <a:fillRef idx="1">
+            <a:schemeClr val="accent1"/>
+          </a:fillRef>
+          <a:effectRef idx="0">
+            <a:schemeClr val="accent1"/>
+          </a:effectRef>
+          <a:fontRef idx="minor">
+            <a:schemeClr val="lt1"/>
+          </a:fontRef>
+        </p:style>
+        <p:txBody>
+          <a:bodyPr rtlCol="0" anchor="ctr"/>
+          <a:lstStyle/>
+          <a:p>
+            <a:pPr algn="ctr"/>
+            <a:endParaRPr lang="en-US"/>
+          </a:p>
+        </p:txBody>
+      </p:sp>
+      <p:sp>
+        <p:nvSpPr>
+          <p:cNvPr id="58" name="Oval 57"/>
+          <p:cNvSpPr/>
+          <p:nvPr/>
+        </p:nvSpPr>
+        <p:spPr>
+          <a:xfrm>
+            <a:off x="5606465" y="5600182"/>
+            <a:ext cx="220513" cy="227691"/>
+          </a:xfrm>
+          <a:prstGeom prst="ellipse">
+            <a:avLst/>
+          </a:prstGeom>
+          <a:solidFill>
+            <a:schemeClr val="accent1">
+              <a:lumMod val="60000"/>
+              <a:lumOff val="40000"/>
+            </a:schemeClr>
+          </a:solidFill>
+          <a:ln w="50800"/>
+          <a:effectLst>
+            <a:outerShdw blurRad="50800" dist="38100" dir="8100000" algn="tr" rotWithShape="0">
+              <a:prstClr val="black">
+                <a:alpha val="40000"/>
+              </a:prstClr>
+            </a:outerShdw>
+          </a:effectLst>
+        </p:spPr>
+        <p:style>
+          <a:lnRef idx="2">
+            <a:schemeClr val="accent1">
+              <a:shade val="50000"/>
+            </a:schemeClr>
+          </a:lnRef>
+          <a:fillRef idx="1">
+            <a:schemeClr val="accent1"/>
+          </a:fillRef>
+          <a:effectRef idx="0">
+            <a:schemeClr val="accent1"/>
+          </a:effectRef>
+          <a:fontRef idx="minor">
+            <a:schemeClr val="lt1"/>
+          </a:fontRef>
+        </p:style>
+        <p:txBody>
+          <a:bodyPr rtlCol="0" anchor="ctr"/>
+          <a:lstStyle/>
+          <a:p>
+            <a:pPr algn="ctr"/>
+            <a:endParaRPr lang="en-US"/>
+          </a:p>
+        </p:txBody>
+      </p:sp>
+      <p:sp>
+        <p:nvSpPr>
+          <p:cNvPr id="59" name="Oval 58"/>
+          <p:cNvSpPr/>
+          <p:nvPr/>
+        </p:nvSpPr>
+        <p:spPr>
+          <a:xfrm>
+            <a:off x="5606465" y="5905467"/>
+            <a:ext cx="220513" cy="227691"/>
+          </a:xfrm>
+          <a:prstGeom prst="ellipse">
+            <a:avLst/>
+          </a:prstGeom>
+          <a:solidFill>
+            <a:schemeClr val="accent1">
+              <a:lumMod val="60000"/>
+              <a:lumOff val="40000"/>
+            </a:schemeClr>
+          </a:solidFill>
+          <a:ln w="50800"/>
+          <a:effectLst>
+            <a:outerShdw blurRad="50800" dist="38100" dir="8100000" algn="tr" rotWithShape="0">
+              <a:prstClr val="black">
+                <a:alpha val="40000"/>
+              </a:prstClr>
+            </a:outerShdw>
+          </a:effectLst>
+        </p:spPr>
+        <p:style>
+          <a:lnRef idx="2">
+            <a:schemeClr val="accent1">
+              <a:shade val="50000"/>
+            </a:schemeClr>
+          </a:lnRef>
+          <a:fillRef idx="1">
+            <a:schemeClr val="accent1"/>
+          </a:fillRef>
+          <a:effectRef idx="0">
+            <a:schemeClr val="accent1"/>
+          </a:effectRef>
+          <a:fontRef idx="minor">
+            <a:schemeClr val="lt1"/>
+          </a:fontRef>
+        </p:style>
+        <p:txBody>
+          <a:bodyPr rtlCol="0" anchor="ctr"/>
+          <a:lstStyle/>
+          <a:p>
+            <a:pPr algn="ctr"/>
+            <a:endParaRPr lang="en-US"/>
+          </a:p>
+        </p:txBody>
+      </p:sp>
+      <p:sp>
+        <p:nvSpPr>
+          <p:cNvPr id="60" name="Oval 59"/>
+          <p:cNvSpPr/>
+          <p:nvPr/>
+        </p:nvSpPr>
+        <p:spPr>
+          <a:xfrm>
+            <a:off x="5606465" y="6215597"/>
+            <a:ext cx="220513" cy="227691"/>
+          </a:xfrm>
+          <a:prstGeom prst="ellipse">
+            <a:avLst/>
+          </a:prstGeom>
+          <a:solidFill>
+            <a:schemeClr val="accent1">
+              <a:lumMod val="60000"/>
+              <a:lumOff val="40000"/>
+            </a:schemeClr>
+          </a:solidFill>
+          <a:ln w="50800"/>
+          <a:effectLst>
+            <a:outerShdw blurRad="50800" dist="38100" dir="8100000" algn="tr" rotWithShape="0">
+              <a:prstClr val="black">
+                <a:alpha val="40000"/>
+              </a:prstClr>
+            </a:outerShdw>
+          </a:effectLst>
+        </p:spPr>
+        <p:style>
+          <a:lnRef idx="2">
+            <a:schemeClr val="accent1">
+              <a:shade val="50000"/>
+            </a:schemeClr>
+          </a:lnRef>
+          <a:fillRef idx="1">
+            <a:schemeClr val="accent1"/>
+          </a:fillRef>
+          <a:effectRef idx="0">
+            <a:schemeClr val="accent1"/>
+          </a:effectRef>
+          <a:fontRef idx="minor">
+            <a:schemeClr val="lt1"/>
+          </a:fontRef>
+        </p:style>
+        <p:txBody>
+          <a:bodyPr rtlCol="0" anchor="ctr"/>
+          <a:lstStyle/>
+          <a:p>
+            <a:pPr algn="ctr"/>
+            <a:endParaRPr lang="en-US"/>
+          </a:p>
+        </p:txBody>
+      </p:sp>
+      <p:sp>
+        <p:nvSpPr>
+          <p:cNvPr id="61" name="Oval 60"/>
+          <p:cNvSpPr/>
+          <p:nvPr/>
+        </p:nvSpPr>
+        <p:spPr>
+          <a:xfrm>
+            <a:off x="5606465" y="6520882"/>
+            <a:ext cx="220513" cy="227691"/>
+          </a:xfrm>
+          <a:prstGeom prst="ellipse">
+            <a:avLst/>
+          </a:prstGeom>
+          <a:solidFill>
+            <a:schemeClr val="accent1">
+              <a:lumMod val="60000"/>
+              <a:lumOff val="40000"/>
+            </a:schemeClr>
+          </a:solidFill>
+          <a:ln w="50800"/>
+          <a:effectLst>
+            <a:outerShdw blurRad="50800" dist="38100" dir="8100000" algn="tr" rotWithShape="0">
+              <a:prstClr val="black">
+                <a:alpha val="40000"/>
+              </a:prstClr>
+            </a:outerShdw>
+          </a:effectLst>
+        </p:spPr>
+        <p:style>
+          <a:lnRef idx="2">
+            <a:schemeClr val="accent1">
+              <a:shade val="50000"/>
+            </a:schemeClr>
+          </a:lnRef>
+          <a:fillRef idx="1">
+            <a:schemeClr val="accent1"/>
+          </a:fillRef>
+          <a:effectRef idx="0">
+            <a:schemeClr val="accent1"/>
+          </a:effectRef>
+          <a:fontRef idx="minor">
+            <a:schemeClr val="lt1"/>
+          </a:fontRef>
+        </p:style>
+        <p:txBody>
+          <a:bodyPr rtlCol="0" anchor="ctr"/>
+          <a:lstStyle/>
+          <a:p>
+            <a:pPr algn="ctr"/>
+            <a:endParaRPr lang="en-US"/>
+          </a:p>
+        </p:txBody>
+      </p:sp>
+      <p:sp>
+        <p:nvSpPr>
+          <p:cNvPr id="62" name="Oval 61"/>
+          <p:cNvSpPr/>
+          <p:nvPr/>
+        </p:nvSpPr>
+        <p:spPr>
+          <a:xfrm>
+            <a:off x="8263927" y="3801402"/>
+            <a:ext cx="615142" cy="598517"/>
+          </a:xfrm>
+          <a:prstGeom prst="ellipse">
+            <a:avLst/>
+          </a:prstGeom>
+          <a:solidFill>
+            <a:schemeClr val="accent1">
+              <a:lumMod val="60000"/>
+              <a:lumOff val="40000"/>
+            </a:schemeClr>
+          </a:solidFill>
+          <a:ln w="50800"/>
+          <a:effectLst>
+            <a:outerShdw blurRad="50800" dist="38100" dir="8100000" algn="tr" rotWithShape="0">
+              <a:prstClr val="black">
+                <a:alpha val="40000"/>
+              </a:prstClr>
+            </a:outerShdw>
+          </a:effectLst>
+        </p:spPr>
+        <p:style>
+          <a:lnRef idx="2">
+            <a:schemeClr val="accent1">
+              <a:shade val="50000"/>
+            </a:schemeClr>
+          </a:lnRef>
+          <a:fillRef idx="1">
+            <a:schemeClr val="accent1"/>
+          </a:fillRef>
+          <a:effectRef idx="0">
+            <a:schemeClr val="accent1"/>
+          </a:effectRef>
+          <a:fontRef idx="minor">
+            <a:schemeClr val="lt1"/>
+          </a:fontRef>
+        </p:style>
+        <p:txBody>
+          <a:bodyPr rtlCol="0" anchor="ctr"/>
+          <a:lstStyle/>
+          <a:p>
+            <a:pPr algn="ctr"/>
+            <a:endParaRPr lang="en-US"/>
+          </a:p>
+        </p:txBody>
+      </p:sp>
+      <p:sp>
+        <p:nvSpPr>
+          <p:cNvPr id="63" name="Oval 62"/>
+          <p:cNvSpPr/>
+          <p:nvPr/>
+        </p:nvSpPr>
+        <p:spPr>
+          <a:xfrm>
+            <a:off x="8263927" y="4577257"/>
+            <a:ext cx="615142" cy="598517"/>
+          </a:xfrm>
+          <a:prstGeom prst="ellipse">
+            <a:avLst/>
+          </a:prstGeom>
+          <a:solidFill>
+            <a:schemeClr val="accent1">
+              <a:lumMod val="60000"/>
+              <a:lumOff val="40000"/>
+            </a:schemeClr>
+          </a:solidFill>
+          <a:ln w="50800"/>
+          <a:effectLst>
+            <a:outerShdw blurRad="50800" dist="38100" dir="8100000" algn="tr" rotWithShape="0">
+              <a:prstClr val="black">
+                <a:alpha val="40000"/>
+              </a:prstClr>
+            </a:outerShdw>
+          </a:effectLst>
+        </p:spPr>
+        <p:style>
+          <a:lnRef idx="2">
+            <a:schemeClr val="accent1">
+              <a:shade val="50000"/>
+            </a:schemeClr>
+          </a:lnRef>
+          <a:fillRef idx="1">
+            <a:schemeClr val="accent1"/>
+          </a:fillRef>
+          <a:effectRef idx="0">
+            <a:schemeClr val="accent1"/>
+          </a:effectRef>
+          <a:fontRef idx="minor">
+            <a:schemeClr val="lt1"/>
+          </a:fontRef>
+        </p:style>
+        <p:txBody>
+          <a:bodyPr rtlCol="0" anchor="ctr"/>
+          <a:lstStyle/>
+          <a:p>
+            <a:pPr algn="ctr"/>
+            <a:endParaRPr lang="en-US"/>
+          </a:p>
+        </p:txBody>
+      </p:sp>
+      <p:sp>
+        <p:nvSpPr>
+          <p:cNvPr id="64" name="Oval 63"/>
+          <p:cNvSpPr/>
+          <p:nvPr/>
+        </p:nvSpPr>
+        <p:spPr>
+          <a:xfrm>
+            <a:off x="8263927" y="5350341"/>
+            <a:ext cx="615142" cy="598517"/>
+          </a:xfrm>
+          <a:prstGeom prst="ellipse">
+            <a:avLst/>
+          </a:prstGeom>
+          <a:solidFill>
+            <a:schemeClr val="accent1">
+              <a:lumMod val="60000"/>
+              <a:lumOff val="40000"/>
+            </a:schemeClr>
+          </a:solidFill>
+          <a:ln w="50800"/>
+          <a:effectLst>
+            <a:outerShdw blurRad="50800" dist="38100" dir="8100000" algn="tr" rotWithShape="0">
+              <a:prstClr val="black">
+                <a:alpha val="40000"/>
+              </a:prstClr>
+            </a:outerShdw>
+          </a:effectLst>
+        </p:spPr>
+        <p:style>
+          <a:lnRef idx="2">
+            <a:schemeClr val="accent1">
+              <a:shade val="50000"/>
+            </a:schemeClr>
+          </a:lnRef>
+          <a:fillRef idx="1">
+            <a:schemeClr val="accent1"/>
+          </a:fillRef>
+          <a:effectRef idx="0">
+            <a:schemeClr val="accent1"/>
+          </a:effectRef>
+          <a:fontRef idx="minor">
+            <a:schemeClr val="lt1"/>
+          </a:fontRef>
+        </p:style>
+        <p:txBody>
+          <a:bodyPr rtlCol="0" anchor="ctr"/>
+          <a:lstStyle/>
+          <a:p>
+            <a:pPr algn="ctr"/>
+            <a:endParaRPr lang="en-US"/>
+          </a:p>
+        </p:txBody>
+      </p:sp>
+      <p:sp>
+        <p:nvSpPr>
+          <p:cNvPr id="65" name="TextBox 64"/>
+          <p:cNvSpPr txBox="1"/>
+          <p:nvPr/>
+        </p:nvSpPr>
+        <p:spPr>
+          <a:xfrm>
+            <a:off x="9149362" y="3922556"/>
+            <a:ext cx="1653273" cy="369332"/>
+          </a:xfrm>
+          <a:prstGeom prst="rect">
+            <a:avLst/>
+          </a:prstGeom>
+          <a:noFill/>
+          <a:effectLst>
+            <a:softEdge rad="25400"/>
+          </a:effectLst>
+        </p:spPr>
+        <p:txBody>
+          <a:bodyPr wrap="none" rtlCol="0">
+            <a:spAutoFit/>
+          </a:bodyPr>
+          <a:lstStyle/>
+          <a:p>
+            <a:r>
+              <a:rPr lang="en-US" b="1" dirty="0" smtClean="0">
+                <a:latin typeface="Segoe UI" panose="020B0502040204020203" pitchFamily="34" charset="0"/>
+                <a:cs typeface="Segoe UI" panose="020B0502040204020203" pitchFamily="34" charset="0"/>
+              </a:rPr>
+              <a:t>Services (IYC)</a:t>
+            </a:r>
+            <a:endParaRPr lang="en-US" b="1" dirty="0">
+              <a:latin typeface="Segoe UI" panose="020B0502040204020203" pitchFamily="34" charset="0"/>
+              <a:cs typeface="Segoe UI" panose="020B0502040204020203" pitchFamily="34" charset="0"/>
+            </a:endParaRPr>
+          </a:p>
+        </p:txBody>
+      </p:sp>
+      <p:sp>
+        <p:nvSpPr>
+          <p:cNvPr id="66" name="TextBox 65"/>
+          <p:cNvSpPr txBox="1"/>
+          <p:nvPr/>
+        </p:nvSpPr>
+        <p:spPr>
+          <a:xfrm>
+            <a:off x="9149362" y="4698411"/>
+            <a:ext cx="1977529" cy="369332"/>
+          </a:xfrm>
+          <a:prstGeom prst="rect">
+            <a:avLst/>
+          </a:prstGeom>
+          <a:noFill/>
+          <a:effectLst>
+            <a:softEdge rad="25400"/>
+          </a:effectLst>
+        </p:spPr>
+        <p:txBody>
+          <a:bodyPr wrap="none" rtlCol="0">
+            <a:spAutoFit/>
+          </a:bodyPr>
+          <a:lstStyle/>
+          <a:p>
+            <a:r>
+              <a:rPr lang="en-US" b="1" dirty="0" smtClean="0">
+                <a:latin typeface="Segoe UI" panose="020B0502040204020203" pitchFamily="34" charset="0"/>
+                <a:cs typeface="Segoe UI" panose="020B0502040204020203" pitchFamily="34" charset="0"/>
+              </a:rPr>
+              <a:t>Healthcare (IYH)</a:t>
+            </a:r>
+            <a:endParaRPr lang="en-US" b="1" dirty="0">
+              <a:latin typeface="Segoe UI" panose="020B0502040204020203" pitchFamily="34" charset="0"/>
+              <a:cs typeface="Segoe UI" panose="020B0502040204020203" pitchFamily="34" charset="0"/>
+            </a:endParaRPr>
+          </a:p>
+        </p:txBody>
+      </p:sp>
+      <p:sp>
+        <p:nvSpPr>
+          <p:cNvPr id="67" name="TextBox 66"/>
+          <p:cNvSpPr txBox="1"/>
+          <p:nvPr/>
+        </p:nvSpPr>
+        <p:spPr>
+          <a:xfrm>
+            <a:off x="9149362" y="5471495"/>
+            <a:ext cx="1664238" cy="369332"/>
+          </a:xfrm>
+          <a:prstGeom prst="rect">
+            <a:avLst/>
+          </a:prstGeom>
+          <a:noFill/>
+          <a:effectLst>
+            <a:softEdge rad="25400"/>
+          </a:effectLst>
+        </p:spPr>
+        <p:txBody>
+          <a:bodyPr wrap="none" rtlCol="0">
+            <a:spAutoFit/>
+          </a:bodyPr>
+          <a:lstStyle/>
+          <a:p>
+            <a:r>
+              <a:rPr lang="en-US" b="1" dirty="0" smtClean="0">
+                <a:latin typeface="Segoe UI" panose="020B0502040204020203" pitchFamily="34" charset="0"/>
+                <a:cs typeface="Segoe UI" panose="020B0502040204020203" pitchFamily="34" charset="0"/>
+              </a:rPr>
+              <a:t>Utilities (IDU)</a:t>
+            </a:r>
+            <a:endParaRPr lang="en-US" b="1" dirty="0">
+              <a:latin typeface="Segoe UI" panose="020B0502040204020203" pitchFamily="34" charset="0"/>
+              <a:cs typeface="Segoe UI" panose="020B0502040204020203" pitchFamily="34" charset="0"/>
+            </a:endParaRPr>
+          </a:p>
+        </p:txBody>
+      </p:sp>
+      <p:sp>
+        <p:nvSpPr>
+          <p:cNvPr id="70" name="TextBox 69"/>
+          <p:cNvSpPr txBox="1"/>
+          <p:nvPr/>
+        </p:nvSpPr>
+        <p:spPr>
+          <a:xfrm>
+            <a:off x="2046409" y="59752"/>
+            <a:ext cx="1754198" cy="461665"/>
+          </a:xfrm>
+          <a:prstGeom prst="rect">
+            <a:avLst/>
+          </a:prstGeom>
+          <a:noFill/>
+          <a:effectLst>
+            <a:softEdge rad="25400"/>
+          </a:effectLst>
+        </p:spPr>
+        <p:txBody>
+          <a:bodyPr wrap="none" rtlCol="0">
+            <a:spAutoFit/>
+          </a:bodyPr>
+          <a:lstStyle/>
+          <a:p>
+            <a:r>
+              <a:rPr lang="en-US" sz="2400" b="1" dirty="0" smtClean="0">
+                <a:latin typeface="Segoe UI" panose="020B0502040204020203" pitchFamily="34" charset="0"/>
+                <a:cs typeface="Segoe UI" panose="020B0502040204020203" pitchFamily="34" charset="0"/>
+              </a:rPr>
+              <a:t>Input layer</a:t>
+            </a:r>
+            <a:endParaRPr lang="en-US" sz="2400" b="1" dirty="0">
+              <a:latin typeface="Segoe UI" panose="020B0502040204020203" pitchFamily="34" charset="0"/>
+              <a:cs typeface="Segoe UI" panose="020B0502040204020203" pitchFamily="34" charset="0"/>
+            </a:endParaRPr>
+          </a:p>
+        </p:txBody>
+      </p:sp>
+      <p:sp>
+        <p:nvSpPr>
+          <p:cNvPr id="71" name="TextBox 70"/>
+          <p:cNvSpPr txBox="1"/>
+          <p:nvPr/>
+        </p:nvSpPr>
+        <p:spPr>
+          <a:xfrm>
+            <a:off x="4700962" y="59752"/>
+            <a:ext cx="2031518" cy="461665"/>
+          </a:xfrm>
+          <a:prstGeom prst="rect">
+            <a:avLst/>
+          </a:prstGeom>
+          <a:noFill/>
+          <a:effectLst>
+            <a:softEdge rad="25400"/>
+          </a:effectLst>
+        </p:spPr>
+        <p:txBody>
+          <a:bodyPr wrap="none" rtlCol="0">
+            <a:spAutoFit/>
+          </a:bodyPr>
+          <a:lstStyle/>
+          <a:p>
+            <a:r>
+              <a:rPr lang="en-US" sz="2400" b="1" dirty="0" smtClean="0">
+                <a:latin typeface="Segoe UI" panose="020B0502040204020203" pitchFamily="34" charset="0"/>
+                <a:cs typeface="Segoe UI" panose="020B0502040204020203" pitchFamily="34" charset="0"/>
+              </a:rPr>
+              <a:t>Hidden layer</a:t>
+            </a:r>
+            <a:endParaRPr lang="en-US" sz="2400" b="1" dirty="0">
+              <a:latin typeface="Segoe UI" panose="020B0502040204020203" pitchFamily="34" charset="0"/>
+              <a:cs typeface="Segoe UI" panose="020B0502040204020203" pitchFamily="34" charset="0"/>
+            </a:endParaRPr>
+          </a:p>
+        </p:txBody>
+      </p:sp>
+      <p:sp>
+        <p:nvSpPr>
+          <p:cNvPr id="72" name="TextBox 71"/>
+          <p:cNvSpPr txBox="1"/>
+          <p:nvPr/>
+        </p:nvSpPr>
+        <p:spPr>
+          <a:xfrm>
+            <a:off x="7562131" y="59752"/>
+            <a:ext cx="2010679" cy="461665"/>
+          </a:xfrm>
+          <a:prstGeom prst="rect">
+            <a:avLst/>
+          </a:prstGeom>
+          <a:noFill/>
+          <a:effectLst>
+            <a:softEdge rad="25400"/>
+          </a:effectLst>
+        </p:spPr>
+        <p:txBody>
+          <a:bodyPr wrap="none" rtlCol="0">
+            <a:spAutoFit/>
+          </a:bodyPr>
+          <a:lstStyle/>
+          <a:p>
+            <a:r>
+              <a:rPr lang="en-US" sz="2400" b="1" dirty="0" smtClean="0">
+                <a:latin typeface="Segoe UI" panose="020B0502040204020203" pitchFamily="34" charset="0"/>
+                <a:cs typeface="Segoe UI" panose="020B0502040204020203" pitchFamily="34" charset="0"/>
+              </a:rPr>
+              <a:t>Output layer</a:t>
+            </a:r>
+            <a:endParaRPr lang="en-US" sz="2400" b="1" dirty="0">
+              <a:latin typeface="Segoe UI" panose="020B0502040204020203" pitchFamily="34" charset="0"/>
+              <a:cs typeface="Segoe UI" panose="020B0502040204020203" pitchFamily="34" charset="0"/>
+            </a:endParaRPr>
+          </a:p>
+        </p:txBody>
+      </p:sp>
+      <p:cxnSp>
+        <p:nvCxnSpPr>
+          <p:cNvPr id="74" name="Straight Arrow Connector 73"/>
+          <p:cNvCxnSpPr>
+            <a:stCxn id="15" idx="6"/>
+            <a:endCxn id="42" idx="2"/>
+          </p:cNvCxnSpPr>
+          <p:nvPr/>
+        </p:nvCxnSpPr>
+        <p:spPr>
+          <a:xfrm flipV="1">
+            <a:off x="3136868" y="787117"/>
+            <a:ext cx="2475571" cy="624811"/>
+          </a:xfrm>
+          <a:prstGeom prst="straightConnector1">
+            <a:avLst/>
+          </a:prstGeom>
+          <a:ln>
+            <a:tailEnd type="triangle"/>
+          </a:ln>
+        </p:spPr>
+        <p:style>
+          <a:lnRef idx="1">
+            <a:schemeClr val="accent1"/>
+          </a:lnRef>
+          <a:fillRef idx="0">
+            <a:schemeClr val="accent1"/>
+          </a:fillRef>
+          <a:effectRef idx="0">
+            <a:schemeClr val="accent1"/>
+          </a:effectRef>
+          <a:fontRef idx="minor">
+            <a:schemeClr val="tx1"/>
+          </a:fontRef>
+        </p:style>
+      </p:cxnSp>
+      <p:cxnSp>
+        <p:nvCxnSpPr>
+          <p:cNvPr id="84" name="Straight Arrow Connector 83"/>
+          <p:cNvCxnSpPr>
+            <a:stCxn id="41" idx="6"/>
+            <a:endCxn id="44" idx="2"/>
+          </p:cNvCxnSpPr>
+          <p:nvPr/>
+        </p:nvCxnSpPr>
+        <p:spPr>
+          <a:xfrm flipV="1">
+            <a:off x="3136868" y="1402532"/>
+            <a:ext cx="2475571" cy="4472122"/>
+          </a:xfrm>
+          <a:prstGeom prst="straightConnector1">
+            <a:avLst/>
+          </a:prstGeom>
+          <a:ln>
+            <a:tailEnd type="triangle"/>
+          </a:ln>
+        </p:spPr>
+        <p:style>
+          <a:lnRef idx="1">
+            <a:schemeClr val="accent1"/>
+          </a:lnRef>
+          <a:fillRef idx="0">
+            <a:schemeClr val="accent1"/>
+          </a:fillRef>
+          <a:effectRef idx="0">
+            <a:schemeClr val="accent1"/>
+          </a:effectRef>
+          <a:fontRef idx="minor">
+            <a:schemeClr val="tx1"/>
+          </a:fontRef>
+        </p:style>
+      </p:cxnSp>
+      <p:cxnSp>
+        <p:nvCxnSpPr>
+          <p:cNvPr id="88" name="Straight Arrow Connector 87"/>
+          <p:cNvCxnSpPr>
+            <a:stCxn id="41" idx="6"/>
+            <a:endCxn id="42" idx="2"/>
+          </p:cNvCxnSpPr>
+          <p:nvPr/>
+        </p:nvCxnSpPr>
+        <p:spPr>
+          <a:xfrm flipV="1">
+            <a:off x="3136868" y="787117"/>
+            <a:ext cx="2475571" cy="5087537"/>
+          </a:xfrm>
+          <a:prstGeom prst="straightConnector1">
+            <a:avLst/>
+          </a:prstGeom>
+          <a:ln>
+            <a:tailEnd type="triangle"/>
+          </a:ln>
+        </p:spPr>
+        <p:style>
+          <a:lnRef idx="1">
+            <a:schemeClr val="accent1"/>
+          </a:lnRef>
+          <a:fillRef idx="0">
+            <a:schemeClr val="accent1"/>
+          </a:fillRef>
+          <a:effectRef idx="0">
+            <a:schemeClr val="accent1"/>
+          </a:effectRef>
+          <a:fontRef idx="minor">
+            <a:schemeClr val="tx1"/>
+          </a:fontRef>
+        </p:style>
+      </p:cxnSp>
+      <p:cxnSp>
+        <p:nvCxnSpPr>
+          <p:cNvPr id="91" name="Straight Arrow Connector 90"/>
+          <p:cNvCxnSpPr>
+            <a:stCxn id="41" idx="6"/>
+            <a:endCxn id="43" idx="2"/>
+          </p:cNvCxnSpPr>
+          <p:nvPr/>
+        </p:nvCxnSpPr>
+        <p:spPr>
+          <a:xfrm flipV="1">
+            <a:off x="3136868" y="1092402"/>
+            <a:ext cx="2475571" cy="4782252"/>
+          </a:xfrm>
+          <a:prstGeom prst="straightConnector1">
+            <a:avLst/>
+          </a:prstGeom>
+          <a:ln>
+            <a:tailEnd type="triangle"/>
+          </a:ln>
+        </p:spPr>
+        <p:style>
+          <a:lnRef idx="1">
+            <a:schemeClr val="accent1"/>
+          </a:lnRef>
+          <a:fillRef idx="0">
+            <a:schemeClr val="accent1"/>
+          </a:fillRef>
+          <a:effectRef idx="0">
+            <a:schemeClr val="accent1"/>
+          </a:effectRef>
+          <a:fontRef idx="minor">
+            <a:schemeClr val="tx1"/>
+          </a:fontRef>
+        </p:style>
+      </p:cxnSp>
+      <p:cxnSp>
+        <p:nvCxnSpPr>
+          <p:cNvPr id="94" name="Straight Arrow Connector 93"/>
+          <p:cNvCxnSpPr>
+            <a:stCxn id="41" idx="6"/>
+            <a:endCxn id="45" idx="2"/>
+          </p:cNvCxnSpPr>
+          <p:nvPr/>
+        </p:nvCxnSpPr>
+        <p:spPr>
+          <a:xfrm flipV="1">
+            <a:off x="3136868" y="1707817"/>
+            <a:ext cx="2475571" cy="4166837"/>
+          </a:xfrm>
+          <a:prstGeom prst="straightConnector1">
+            <a:avLst/>
+          </a:prstGeom>
+          <a:ln>
+            <a:tailEnd type="triangle"/>
+          </a:ln>
+        </p:spPr>
+        <p:style>
+          <a:lnRef idx="1">
+            <a:schemeClr val="accent1"/>
+          </a:lnRef>
+          <a:fillRef idx="0">
+            <a:schemeClr val="accent1"/>
+          </a:fillRef>
+          <a:effectRef idx="0">
+            <a:schemeClr val="accent1"/>
+          </a:effectRef>
+          <a:fontRef idx="minor">
+            <a:schemeClr val="tx1"/>
+          </a:fontRef>
+        </p:style>
+      </p:cxnSp>
+      <p:cxnSp>
+        <p:nvCxnSpPr>
+          <p:cNvPr id="98" name="Straight Arrow Connector 97"/>
+          <p:cNvCxnSpPr>
+            <a:stCxn id="41" idx="6"/>
+            <a:endCxn id="46" idx="2"/>
+          </p:cNvCxnSpPr>
+          <p:nvPr/>
+        </p:nvCxnSpPr>
+        <p:spPr>
+          <a:xfrm flipV="1">
+            <a:off x="3136868" y="2019402"/>
+            <a:ext cx="2475571" cy="3855252"/>
+          </a:xfrm>
+          <a:prstGeom prst="straightConnector1">
+            <a:avLst/>
+          </a:prstGeom>
+          <a:ln>
+            <a:tailEnd type="triangle"/>
+          </a:ln>
+        </p:spPr>
+        <p:style>
+          <a:lnRef idx="1">
+            <a:schemeClr val="accent1"/>
+          </a:lnRef>
+          <a:fillRef idx="0">
+            <a:schemeClr val="accent1"/>
+          </a:fillRef>
+          <a:effectRef idx="0">
+            <a:schemeClr val="accent1"/>
+          </a:effectRef>
+          <a:fontRef idx="minor">
+            <a:schemeClr val="tx1"/>
+          </a:fontRef>
+        </p:style>
+      </p:cxnSp>
+      <p:cxnSp>
+        <p:nvCxnSpPr>
+          <p:cNvPr id="101" name="Straight Arrow Connector 100"/>
+          <p:cNvCxnSpPr>
+            <a:stCxn id="41" idx="6"/>
+            <a:endCxn id="47" idx="2"/>
+          </p:cNvCxnSpPr>
+          <p:nvPr/>
+        </p:nvCxnSpPr>
+        <p:spPr>
+          <a:xfrm flipV="1">
+            <a:off x="3136868" y="2324687"/>
+            <a:ext cx="2475571" cy="3549967"/>
+          </a:xfrm>
+          <a:prstGeom prst="straightConnector1">
+            <a:avLst/>
+          </a:prstGeom>
+          <a:ln>
+            <a:tailEnd type="triangle"/>
+          </a:ln>
+        </p:spPr>
+        <p:style>
+          <a:lnRef idx="1">
+            <a:schemeClr val="accent1"/>
+          </a:lnRef>
+          <a:fillRef idx="0">
+            <a:schemeClr val="accent1"/>
+          </a:fillRef>
+          <a:effectRef idx="0">
+            <a:schemeClr val="accent1"/>
+          </a:effectRef>
+          <a:fontRef idx="minor">
+            <a:schemeClr val="tx1"/>
+          </a:fontRef>
+        </p:style>
+      </p:cxnSp>
+      <p:cxnSp>
+        <p:nvCxnSpPr>
+          <p:cNvPr id="104" name="Straight Arrow Connector 103"/>
+          <p:cNvCxnSpPr>
+            <a:stCxn id="41" idx="6"/>
+            <a:endCxn id="48" idx="2"/>
+          </p:cNvCxnSpPr>
+          <p:nvPr/>
+        </p:nvCxnSpPr>
+        <p:spPr>
+          <a:xfrm flipV="1">
+            <a:off x="3136868" y="2634817"/>
+            <a:ext cx="2475571" cy="3239837"/>
+          </a:xfrm>
+          <a:prstGeom prst="straightConnector1">
+            <a:avLst/>
+          </a:prstGeom>
+          <a:ln>
+            <a:tailEnd type="triangle"/>
+          </a:ln>
+        </p:spPr>
+        <p:style>
+          <a:lnRef idx="1">
+            <a:schemeClr val="accent1"/>
+          </a:lnRef>
+          <a:fillRef idx="0">
+            <a:schemeClr val="accent1"/>
+          </a:fillRef>
+          <a:effectRef idx="0">
+            <a:schemeClr val="accent1"/>
+          </a:effectRef>
+          <a:fontRef idx="minor">
+            <a:schemeClr val="tx1"/>
+          </a:fontRef>
+        </p:style>
+      </p:cxnSp>
+      <p:cxnSp>
+        <p:nvCxnSpPr>
+          <p:cNvPr id="106" name="Straight Arrow Connector 105"/>
+          <p:cNvCxnSpPr>
+            <a:stCxn id="41" idx="6"/>
+            <a:endCxn id="49" idx="2"/>
+          </p:cNvCxnSpPr>
+          <p:nvPr/>
+        </p:nvCxnSpPr>
+        <p:spPr>
+          <a:xfrm flipV="1">
+            <a:off x="3136868" y="2940102"/>
+            <a:ext cx="2475571" cy="2934552"/>
+          </a:xfrm>
+          <a:prstGeom prst="straightConnector1">
+            <a:avLst/>
+          </a:prstGeom>
+          <a:ln>
+            <a:tailEnd type="triangle"/>
+          </a:ln>
+        </p:spPr>
+        <p:style>
+          <a:lnRef idx="1">
+            <a:schemeClr val="accent1"/>
+          </a:lnRef>
+          <a:fillRef idx="0">
+            <a:schemeClr val="accent1"/>
+          </a:fillRef>
+          <a:effectRef idx="0">
+            <a:schemeClr val="accent1"/>
+          </a:effectRef>
+          <a:fontRef idx="minor">
+            <a:schemeClr val="tx1"/>
+          </a:fontRef>
+        </p:style>
+      </p:cxnSp>
+      <p:cxnSp>
+        <p:nvCxnSpPr>
+          <p:cNvPr id="108" name="Straight Arrow Connector 107"/>
+          <p:cNvCxnSpPr>
+            <a:stCxn id="41" idx="6"/>
+            <a:endCxn id="50" idx="2"/>
+          </p:cNvCxnSpPr>
+          <p:nvPr/>
+        </p:nvCxnSpPr>
+        <p:spPr>
+          <a:xfrm flipV="1">
+            <a:off x="3136868" y="3255758"/>
+            <a:ext cx="2469597" cy="2618896"/>
+          </a:xfrm>
+          <a:prstGeom prst="straightConnector1">
+            <a:avLst/>
+          </a:prstGeom>
+          <a:ln>
+            <a:tailEnd type="triangle"/>
+          </a:ln>
+        </p:spPr>
+        <p:style>
+          <a:lnRef idx="1">
+            <a:schemeClr val="accent1"/>
+          </a:lnRef>
+          <a:fillRef idx="0">
+            <a:schemeClr val="accent1"/>
+          </a:fillRef>
+          <a:effectRef idx="0">
+            <a:schemeClr val="accent1"/>
+          </a:effectRef>
+          <a:fontRef idx="minor">
+            <a:schemeClr val="tx1"/>
+          </a:fontRef>
+        </p:style>
+      </p:cxnSp>
+      <p:cxnSp>
+        <p:nvCxnSpPr>
+          <p:cNvPr id="110" name="Straight Arrow Connector 109"/>
+          <p:cNvCxnSpPr>
+            <a:stCxn id="41" idx="6"/>
+            <a:endCxn id="51" idx="2"/>
+          </p:cNvCxnSpPr>
+          <p:nvPr/>
+        </p:nvCxnSpPr>
+        <p:spPr>
+          <a:xfrm flipV="1">
+            <a:off x="3136868" y="3561043"/>
+            <a:ext cx="2469597" cy="2313611"/>
+          </a:xfrm>
+          <a:prstGeom prst="straightConnector1">
+            <a:avLst/>
+          </a:prstGeom>
+          <a:ln>
+            <a:tailEnd type="triangle"/>
+          </a:ln>
+        </p:spPr>
+        <p:style>
+          <a:lnRef idx="1">
+            <a:schemeClr val="accent1"/>
+          </a:lnRef>
+          <a:fillRef idx="0">
+            <a:schemeClr val="accent1"/>
+          </a:fillRef>
+          <a:effectRef idx="0">
+            <a:schemeClr val="accent1"/>
+          </a:effectRef>
+          <a:fontRef idx="minor">
+            <a:schemeClr val="tx1"/>
+          </a:fontRef>
+        </p:style>
+      </p:cxnSp>
+      <p:cxnSp>
+        <p:nvCxnSpPr>
+          <p:cNvPr id="112" name="Straight Arrow Connector 111"/>
+          <p:cNvCxnSpPr>
+            <a:stCxn id="41" idx="6"/>
+            <a:endCxn id="52" idx="2"/>
+          </p:cNvCxnSpPr>
+          <p:nvPr/>
+        </p:nvCxnSpPr>
+        <p:spPr>
+          <a:xfrm flipV="1">
+            <a:off x="3136868" y="3871173"/>
+            <a:ext cx="2469597" cy="2003481"/>
+          </a:xfrm>
+          <a:prstGeom prst="straightConnector1">
+            <a:avLst/>
+          </a:prstGeom>
+          <a:ln>
+            <a:tailEnd type="triangle"/>
+          </a:ln>
+        </p:spPr>
+        <p:style>
+          <a:lnRef idx="1">
+            <a:schemeClr val="accent1"/>
+          </a:lnRef>
+          <a:fillRef idx="0">
+            <a:schemeClr val="accent1"/>
+          </a:fillRef>
+          <a:effectRef idx="0">
+            <a:schemeClr val="accent1"/>
+          </a:effectRef>
+          <a:fontRef idx="minor">
+            <a:schemeClr val="tx1"/>
+          </a:fontRef>
+        </p:style>
+      </p:cxnSp>
+      <p:cxnSp>
+        <p:nvCxnSpPr>
+          <p:cNvPr id="115" name="Straight Arrow Connector 114"/>
+          <p:cNvCxnSpPr>
+            <a:stCxn id="41" idx="6"/>
+            <a:endCxn id="53" idx="2"/>
+          </p:cNvCxnSpPr>
+          <p:nvPr/>
+        </p:nvCxnSpPr>
+        <p:spPr>
+          <a:xfrm flipV="1">
+            <a:off x="3136868" y="4176458"/>
+            <a:ext cx="2469597" cy="1698196"/>
+          </a:xfrm>
+          <a:prstGeom prst="straightConnector1">
+            <a:avLst/>
+          </a:prstGeom>
+          <a:ln>
+            <a:tailEnd type="triangle"/>
+          </a:ln>
+        </p:spPr>
+        <p:style>
+          <a:lnRef idx="1">
+            <a:schemeClr val="accent1"/>
+          </a:lnRef>
+          <a:fillRef idx="0">
+            <a:schemeClr val="accent1"/>
+          </a:fillRef>
+          <a:effectRef idx="0">
+            <a:schemeClr val="accent1"/>
+          </a:effectRef>
+          <a:fontRef idx="minor">
+            <a:schemeClr val="tx1"/>
+          </a:fontRef>
+        </p:style>
+      </p:cxnSp>
+      <p:cxnSp>
+        <p:nvCxnSpPr>
+          <p:cNvPr id="117" name="Straight Arrow Connector 116"/>
+          <p:cNvCxnSpPr>
+            <a:stCxn id="41" idx="6"/>
+            <a:endCxn id="55" idx="2"/>
+          </p:cNvCxnSpPr>
+          <p:nvPr/>
+        </p:nvCxnSpPr>
+        <p:spPr>
+          <a:xfrm flipV="1">
+            <a:off x="3136868" y="4793328"/>
+            <a:ext cx="2469597" cy="1081326"/>
+          </a:xfrm>
+          <a:prstGeom prst="straightConnector1">
+            <a:avLst/>
+          </a:prstGeom>
+          <a:ln>
+            <a:tailEnd type="triangle"/>
+          </a:ln>
+        </p:spPr>
+        <p:style>
+          <a:lnRef idx="1">
+            <a:schemeClr val="accent1"/>
+          </a:lnRef>
+          <a:fillRef idx="0">
+            <a:schemeClr val="accent1"/>
+          </a:fillRef>
+          <a:effectRef idx="0">
+            <a:schemeClr val="accent1"/>
+          </a:effectRef>
+          <a:fontRef idx="minor">
+            <a:schemeClr val="tx1"/>
+          </a:fontRef>
+        </p:style>
+      </p:cxnSp>
+      <p:cxnSp>
+        <p:nvCxnSpPr>
+          <p:cNvPr id="119" name="Straight Arrow Connector 118"/>
+          <p:cNvCxnSpPr>
+            <a:stCxn id="41" idx="6"/>
+            <a:endCxn id="54" idx="2"/>
+          </p:cNvCxnSpPr>
+          <p:nvPr/>
+        </p:nvCxnSpPr>
+        <p:spPr>
+          <a:xfrm flipV="1">
+            <a:off x="3136868" y="4488043"/>
+            <a:ext cx="2469597" cy="1386611"/>
+          </a:xfrm>
+          <a:prstGeom prst="straightConnector1">
+            <a:avLst/>
+          </a:prstGeom>
+          <a:ln>
+            <a:tailEnd type="triangle"/>
+          </a:ln>
+        </p:spPr>
+        <p:style>
+          <a:lnRef idx="1">
+            <a:schemeClr val="accent1"/>
+          </a:lnRef>
+          <a:fillRef idx="0">
+            <a:schemeClr val="accent1"/>
+          </a:fillRef>
+          <a:effectRef idx="0">
+            <a:schemeClr val="accent1"/>
+          </a:effectRef>
+          <a:fontRef idx="minor">
+            <a:schemeClr val="tx1"/>
+          </a:fontRef>
+        </p:style>
+      </p:cxnSp>
+      <p:cxnSp>
+        <p:nvCxnSpPr>
+          <p:cNvPr id="121" name="Straight Arrow Connector 120"/>
+          <p:cNvCxnSpPr>
+            <a:stCxn id="41" idx="6"/>
+            <a:endCxn id="57" idx="2"/>
+          </p:cNvCxnSpPr>
+          <p:nvPr/>
+        </p:nvCxnSpPr>
+        <p:spPr>
+          <a:xfrm flipV="1">
+            <a:off x="3136868" y="5408743"/>
+            <a:ext cx="2469597" cy="465911"/>
+          </a:xfrm>
+          <a:prstGeom prst="straightConnector1">
+            <a:avLst/>
+          </a:prstGeom>
+          <a:ln>
+            <a:tailEnd type="triangle"/>
+          </a:ln>
+        </p:spPr>
+        <p:style>
+          <a:lnRef idx="1">
+            <a:schemeClr val="accent1"/>
+          </a:lnRef>
+          <a:fillRef idx="0">
+            <a:schemeClr val="accent1"/>
+          </a:fillRef>
+          <a:effectRef idx="0">
+            <a:schemeClr val="accent1"/>
+          </a:effectRef>
+          <a:fontRef idx="minor">
+            <a:schemeClr val="tx1"/>
+          </a:fontRef>
+        </p:style>
+      </p:cxnSp>
+      <p:cxnSp>
+        <p:nvCxnSpPr>
+          <p:cNvPr id="123" name="Straight Arrow Connector 122"/>
+          <p:cNvCxnSpPr>
+            <a:stCxn id="41" idx="6"/>
+            <a:endCxn id="56" idx="2"/>
+          </p:cNvCxnSpPr>
+          <p:nvPr/>
+        </p:nvCxnSpPr>
+        <p:spPr>
+          <a:xfrm flipV="1">
+            <a:off x="3136868" y="5103458"/>
+            <a:ext cx="2469597" cy="771196"/>
+          </a:xfrm>
+          <a:prstGeom prst="straightConnector1">
+            <a:avLst/>
+          </a:prstGeom>
+          <a:ln>
+            <a:tailEnd type="triangle"/>
+          </a:ln>
+        </p:spPr>
+        <p:style>
+          <a:lnRef idx="1">
+            <a:schemeClr val="accent1"/>
+          </a:lnRef>
+          <a:fillRef idx="0">
+            <a:schemeClr val="accent1"/>
+          </a:fillRef>
+          <a:effectRef idx="0">
+            <a:schemeClr val="accent1"/>
+          </a:effectRef>
+          <a:fontRef idx="minor">
+            <a:schemeClr val="tx1"/>
+          </a:fontRef>
+        </p:style>
+      </p:cxnSp>
+      <p:cxnSp>
+        <p:nvCxnSpPr>
+          <p:cNvPr id="126" name="Straight Arrow Connector 125"/>
+          <p:cNvCxnSpPr>
+            <a:stCxn id="41" idx="6"/>
+            <a:endCxn id="58" idx="2"/>
+          </p:cNvCxnSpPr>
+          <p:nvPr/>
+        </p:nvCxnSpPr>
+        <p:spPr>
+          <a:xfrm flipV="1">
+            <a:off x="3136868" y="5714028"/>
+            <a:ext cx="2469597" cy="160626"/>
+          </a:xfrm>
+          <a:prstGeom prst="straightConnector1">
+            <a:avLst/>
+          </a:prstGeom>
+          <a:ln>
+            <a:tailEnd type="triangle"/>
+          </a:ln>
+        </p:spPr>
+        <p:style>
+          <a:lnRef idx="1">
+            <a:schemeClr val="accent1"/>
+          </a:lnRef>
+          <a:fillRef idx="0">
+            <a:schemeClr val="accent1"/>
+          </a:fillRef>
+          <a:effectRef idx="0">
+            <a:schemeClr val="accent1"/>
+          </a:effectRef>
+          <a:fontRef idx="minor">
+            <a:schemeClr val="tx1"/>
+          </a:fontRef>
+        </p:style>
+      </p:cxnSp>
+      <p:cxnSp>
+        <p:nvCxnSpPr>
+          <p:cNvPr id="128" name="Straight Arrow Connector 127"/>
+          <p:cNvCxnSpPr>
+            <a:stCxn id="41" idx="6"/>
+            <a:endCxn id="59" idx="2"/>
+          </p:cNvCxnSpPr>
+          <p:nvPr/>
+        </p:nvCxnSpPr>
+        <p:spPr>
+          <a:xfrm>
+            <a:off x="3136868" y="5874654"/>
+            <a:ext cx="2469597" cy="144659"/>
+          </a:xfrm>
+          <a:prstGeom prst="straightConnector1">
+            <a:avLst/>
+          </a:prstGeom>
+          <a:ln>
+            <a:tailEnd type="triangle"/>
+          </a:ln>
+        </p:spPr>
+        <p:style>
+          <a:lnRef idx="1">
+            <a:schemeClr val="accent1"/>
+          </a:lnRef>
+          <a:fillRef idx="0">
+            <a:schemeClr val="accent1"/>
+          </a:fillRef>
+          <a:effectRef idx="0">
+            <a:schemeClr val="accent1"/>
+          </a:effectRef>
+          <a:fontRef idx="minor">
+            <a:schemeClr val="tx1"/>
+          </a:fontRef>
+        </p:style>
+      </p:cxnSp>
+      <p:cxnSp>
+        <p:nvCxnSpPr>
+          <p:cNvPr id="130" name="Straight Arrow Connector 129"/>
+          <p:cNvCxnSpPr>
+            <a:stCxn id="41" idx="6"/>
+            <a:endCxn id="60" idx="2"/>
+          </p:cNvCxnSpPr>
+          <p:nvPr/>
+        </p:nvCxnSpPr>
+        <p:spPr>
+          <a:xfrm>
+            <a:off x="3136868" y="5874654"/>
+            <a:ext cx="2469597" cy="454789"/>
+          </a:xfrm>
+          <a:prstGeom prst="straightConnector1">
+            <a:avLst/>
+          </a:prstGeom>
+          <a:ln>
+            <a:tailEnd type="triangle"/>
+          </a:ln>
+        </p:spPr>
+        <p:style>
+          <a:lnRef idx="1">
+            <a:schemeClr val="accent1"/>
+          </a:lnRef>
+          <a:fillRef idx="0">
+            <a:schemeClr val="accent1"/>
+          </a:fillRef>
+          <a:effectRef idx="0">
+            <a:schemeClr val="accent1"/>
+          </a:effectRef>
+          <a:fontRef idx="minor">
+            <a:schemeClr val="tx1"/>
+          </a:fontRef>
+        </p:style>
+      </p:cxnSp>
+      <p:cxnSp>
+        <p:nvCxnSpPr>
+          <p:cNvPr id="132" name="Straight Arrow Connector 131"/>
+          <p:cNvCxnSpPr>
+            <a:stCxn id="41" idx="6"/>
+            <a:endCxn id="61" idx="2"/>
+          </p:cNvCxnSpPr>
+          <p:nvPr/>
+        </p:nvCxnSpPr>
+        <p:spPr>
+          <a:xfrm>
+            <a:off x="3136868" y="5874654"/>
+            <a:ext cx="2469597" cy="760074"/>
+          </a:xfrm>
+          <a:prstGeom prst="straightConnector1">
+            <a:avLst/>
+          </a:prstGeom>
+          <a:ln>
+            <a:tailEnd type="triangle"/>
+          </a:ln>
+        </p:spPr>
+        <p:style>
+          <a:lnRef idx="1">
+            <a:schemeClr val="accent1"/>
+          </a:lnRef>
+          <a:fillRef idx="0">
+            <a:schemeClr val="accent1"/>
+          </a:fillRef>
+          <a:effectRef idx="0">
+            <a:schemeClr val="accent1"/>
+          </a:effectRef>
+          <a:fontRef idx="minor">
+            <a:schemeClr val="tx1"/>
+          </a:fontRef>
+        </p:style>
+      </p:cxnSp>
+      <p:cxnSp>
+        <p:nvCxnSpPr>
+          <p:cNvPr id="169" name="Straight Arrow Connector 168"/>
+          <p:cNvCxnSpPr>
+            <a:stCxn id="15" idx="6"/>
+            <a:endCxn id="43" idx="2"/>
+          </p:cNvCxnSpPr>
+          <p:nvPr/>
+        </p:nvCxnSpPr>
+        <p:spPr>
+          <a:xfrm flipV="1">
+            <a:off x="3136868" y="1092402"/>
+            <a:ext cx="2475571" cy="319526"/>
+          </a:xfrm>
+          <a:prstGeom prst="straightConnector1">
+            <a:avLst/>
+          </a:prstGeom>
+          <a:ln>
+            <a:tailEnd type="triangle"/>
+          </a:ln>
+        </p:spPr>
+        <p:style>
+          <a:lnRef idx="1">
+            <a:schemeClr val="accent1"/>
+          </a:lnRef>
+          <a:fillRef idx="0">
+            <a:schemeClr val="accent1"/>
+          </a:fillRef>
+          <a:effectRef idx="0">
+            <a:schemeClr val="accent1"/>
+          </a:effectRef>
+          <a:fontRef idx="minor">
+            <a:schemeClr val="tx1"/>
+          </a:fontRef>
+        </p:style>
+      </p:cxnSp>
+      <p:cxnSp>
+        <p:nvCxnSpPr>
+          <p:cNvPr id="172" name="Straight Arrow Connector 171"/>
+          <p:cNvCxnSpPr>
+            <a:stCxn id="15" idx="6"/>
+            <a:endCxn id="44" idx="2"/>
+          </p:cNvCxnSpPr>
+          <p:nvPr/>
+        </p:nvCxnSpPr>
+        <p:spPr>
+          <a:xfrm flipV="1">
+            <a:off x="3136868" y="1402532"/>
+            <a:ext cx="2475571" cy="9396"/>
+          </a:xfrm>
+          <a:prstGeom prst="straightConnector1">
+            <a:avLst/>
+          </a:prstGeom>
+          <a:ln>
+            <a:tailEnd type="triangle"/>
+          </a:ln>
+        </p:spPr>
+        <p:style>
+          <a:lnRef idx="1">
+            <a:schemeClr val="accent1"/>
+          </a:lnRef>
+          <a:fillRef idx="0">
+            <a:schemeClr val="accent1"/>
+          </a:fillRef>
+          <a:effectRef idx="0">
+            <a:schemeClr val="accent1"/>
+          </a:effectRef>
+          <a:fontRef idx="minor">
+            <a:schemeClr val="tx1"/>
+          </a:fontRef>
+        </p:style>
+      </p:cxnSp>
+      <p:cxnSp>
+        <p:nvCxnSpPr>
+          <p:cNvPr id="175" name="Straight Arrow Connector 174"/>
+          <p:cNvCxnSpPr>
+            <a:stCxn id="15" idx="6"/>
+            <a:endCxn id="45" idx="2"/>
+          </p:cNvCxnSpPr>
+          <p:nvPr/>
+        </p:nvCxnSpPr>
+        <p:spPr>
+          <a:xfrm>
+            <a:off x="3136868" y="1411928"/>
+            <a:ext cx="2475571" cy="295889"/>
+          </a:xfrm>
+          <a:prstGeom prst="straightConnector1">
+            <a:avLst/>
+          </a:prstGeom>
+          <a:ln>
+            <a:tailEnd type="triangle"/>
+          </a:ln>
+        </p:spPr>
+        <p:style>
+          <a:lnRef idx="1">
+            <a:schemeClr val="accent1"/>
+          </a:lnRef>
+          <a:fillRef idx="0">
+            <a:schemeClr val="accent1"/>
+          </a:fillRef>
+          <a:effectRef idx="0">
+            <a:schemeClr val="accent1"/>
+          </a:effectRef>
+          <a:fontRef idx="minor">
+            <a:schemeClr val="tx1"/>
+          </a:fontRef>
+        </p:style>
+      </p:cxnSp>
+      <p:cxnSp>
+        <p:nvCxnSpPr>
+          <p:cNvPr id="178" name="Straight Arrow Connector 177"/>
+          <p:cNvCxnSpPr>
+            <a:stCxn id="15" idx="6"/>
+            <a:endCxn id="46" idx="2"/>
+          </p:cNvCxnSpPr>
+          <p:nvPr/>
+        </p:nvCxnSpPr>
+        <p:spPr>
+          <a:xfrm>
+            <a:off x="3136868" y="1411928"/>
+            <a:ext cx="2475571" cy="607474"/>
+          </a:xfrm>
+          <a:prstGeom prst="straightConnector1">
+            <a:avLst/>
+          </a:prstGeom>
+          <a:ln>
+            <a:tailEnd type="triangle"/>
+          </a:ln>
+        </p:spPr>
+        <p:style>
+          <a:lnRef idx="1">
+            <a:schemeClr val="accent1"/>
+          </a:lnRef>
+          <a:fillRef idx="0">
+            <a:schemeClr val="accent1"/>
+          </a:fillRef>
+          <a:effectRef idx="0">
+            <a:schemeClr val="accent1"/>
+          </a:effectRef>
+          <a:fontRef idx="minor">
+            <a:schemeClr val="tx1"/>
+          </a:fontRef>
+        </p:style>
+      </p:cxnSp>
+      <p:cxnSp>
+        <p:nvCxnSpPr>
+          <p:cNvPr id="181" name="Straight Arrow Connector 180"/>
+          <p:cNvCxnSpPr>
+            <a:stCxn id="15" idx="6"/>
+            <a:endCxn id="47" idx="2"/>
+          </p:cNvCxnSpPr>
+          <p:nvPr/>
+        </p:nvCxnSpPr>
+        <p:spPr>
+          <a:xfrm>
+            <a:off x="3136868" y="1411928"/>
+            <a:ext cx="2475571" cy="912759"/>
+          </a:xfrm>
+          <a:prstGeom prst="straightConnector1">
+            <a:avLst/>
+          </a:prstGeom>
+          <a:ln>
+            <a:tailEnd type="triangle"/>
+          </a:ln>
+        </p:spPr>
+        <p:style>
+          <a:lnRef idx="1">
+            <a:schemeClr val="accent1"/>
+          </a:lnRef>
+          <a:fillRef idx="0">
+            <a:schemeClr val="accent1"/>
+          </a:fillRef>
+          <a:effectRef idx="0">
+            <a:schemeClr val="accent1"/>
+          </a:effectRef>
+          <a:fontRef idx="minor">
+            <a:schemeClr val="tx1"/>
+          </a:fontRef>
+        </p:style>
+      </p:cxnSp>
+      <p:cxnSp>
+        <p:nvCxnSpPr>
+          <p:cNvPr id="184" name="Straight Arrow Connector 183"/>
+          <p:cNvCxnSpPr>
+            <a:stCxn id="15" idx="6"/>
+            <a:endCxn id="48" idx="2"/>
+          </p:cNvCxnSpPr>
+          <p:nvPr/>
+        </p:nvCxnSpPr>
+        <p:spPr>
+          <a:xfrm>
+            <a:off x="3136868" y="1411928"/>
+            <a:ext cx="2475571" cy="1222889"/>
+          </a:xfrm>
+          <a:prstGeom prst="straightConnector1">
+            <a:avLst/>
+          </a:prstGeom>
+          <a:ln>
+            <a:tailEnd type="triangle"/>
+          </a:ln>
+        </p:spPr>
+        <p:style>
+          <a:lnRef idx="1">
+            <a:schemeClr val="accent1"/>
+          </a:lnRef>
+          <a:fillRef idx="0">
+            <a:schemeClr val="accent1"/>
+          </a:fillRef>
+          <a:effectRef idx="0">
+            <a:schemeClr val="accent1"/>
+          </a:effectRef>
+          <a:fontRef idx="minor">
+            <a:schemeClr val="tx1"/>
+          </a:fontRef>
+        </p:style>
+      </p:cxnSp>
+      <p:cxnSp>
+        <p:nvCxnSpPr>
+          <p:cNvPr id="187" name="Straight Arrow Connector 186"/>
+          <p:cNvCxnSpPr>
+            <a:stCxn id="15" idx="6"/>
+            <a:endCxn id="49" idx="2"/>
+          </p:cNvCxnSpPr>
+          <p:nvPr/>
+        </p:nvCxnSpPr>
+        <p:spPr>
+          <a:xfrm>
+            <a:off x="3136868" y="1411928"/>
+            <a:ext cx="2475571" cy="1528174"/>
+          </a:xfrm>
+          <a:prstGeom prst="straightConnector1">
+            <a:avLst/>
+          </a:prstGeom>
+          <a:ln>
+            <a:tailEnd type="triangle"/>
+          </a:ln>
+        </p:spPr>
+        <p:style>
+          <a:lnRef idx="1">
+            <a:schemeClr val="accent1"/>
+          </a:lnRef>
+          <a:fillRef idx="0">
+            <a:schemeClr val="accent1"/>
+          </a:fillRef>
+          <a:effectRef idx="0">
+            <a:schemeClr val="accent1"/>
+          </a:effectRef>
+          <a:fontRef idx="minor">
+            <a:schemeClr val="tx1"/>
+          </a:fontRef>
+        </p:style>
+      </p:cxnSp>
+      <p:cxnSp>
+        <p:nvCxnSpPr>
+          <p:cNvPr id="190" name="Straight Arrow Connector 189"/>
+          <p:cNvCxnSpPr>
+            <a:stCxn id="15" idx="6"/>
+            <a:endCxn id="50" idx="2"/>
+          </p:cNvCxnSpPr>
+          <p:nvPr/>
+        </p:nvCxnSpPr>
+        <p:spPr>
+          <a:xfrm>
+            <a:off x="3136868" y="1411928"/>
+            <a:ext cx="2469597" cy="1843830"/>
+          </a:xfrm>
+          <a:prstGeom prst="straightConnector1">
+            <a:avLst/>
+          </a:prstGeom>
+          <a:ln>
+            <a:tailEnd type="triangle"/>
+          </a:ln>
+        </p:spPr>
+        <p:style>
+          <a:lnRef idx="1">
+            <a:schemeClr val="accent1"/>
+          </a:lnRef>
+          <a:fillRef idx="0">
+            <a:schemeClr val="accent1"/>
+          </a:fillRef>
+          <a:effectRef idx="0">
+            <a:schemeClr val="accent1"/>
+          </a:effectRef>
+          <a:fontRef idx="minor">
+            <a:schemeClr val="tx1"/>
+          </a:fontRef>
+        </p:style>
+      </p:cxnSp>
+      <p:cxnSp>
+        <p:nvCxnSpPr>
+          <p:cNvPr id="193" name="Straight Arrow Connector 192"/>
+          <p:cNvCxnSpPr>
+            <a:stCxn id="15" idx="6"/>
+            <a:endCxn id="51" idx="2"/>
+          </p:cNvCxnSpPr>
+          <p:nvPr/>
+        </p:nvCxnSpPr>
+        <p:spPr>
+          <a:xfrm>
+            <a:off x="3136868" y="1411928"/>
+            <a:ext cx="2469597" cy="2149115"/>
+          </a:xfrm>
+          <a:prstGeom prst="straightConnector1">
+            <a:avLst/>
+          </a:prstGeom>
+          <a:ln>
+            <a:tailEnd type="triangle"/>
+          </a:ln>
+        </p:spPr>
+        <p:style>
+          <a:lnRef idx="1">
+            <a:schemeClr val="accent1"/>
+          </a:lnRef>
+          <a:fillRef idx="0">
+            <a:schemeClr val="accent1"/>
+          </a:fillRef>
+          <a:effectRef idx="0">
+            <a:schemeClr val="accent1"/>
+          </a:effectRef>
+          <a:fontRef idx="minor">
+            <a:schemeClr val="tx1"/>
+          </a:fontRef>
+        </p:style>
+      </p:cxnSp>
+      <p:cxnSp>
+        <p:nvCxnSpPr>
+          <p:cNvPr id="196" name="Straight Arrow Connector 195"/>
+          <p:cNvCxnSpPr>
+            <a:stCxn id="15" idx="6"/>
+            <a:endCxn id="52" idx="2"/>
+          </p:cNvCxnSpPr>
+          <p:nvPr/>
+        </p:nvCxnSpPr>
+        <p:spPr>
+          <a:xfrm>
+            <a:off x="3136868" y="1411928"/>
+            <a:ext cx="2469597" cy="2459245"/>
+          </a:xfrm>
+          <a:prstGeom prst="straightConnector1">
+            <a:avLst/>
+          </a:prstGeom>
+          <a:ln>
+            <a:tailEnd type="triangle"/>
+          </a:ln>
+        </p:spPr>
+        <p:style>
+          <a:lnRef idx="1">
+            <a:schemeClr val="accent1"/>
+          </a:lnRef>
+          <a:fillRef idx="0">
+            <a:schemeClr val="accent1"/>
+          </a:fillRef>
+          <a:effectRef idx="0">
+            <a:schemeClr val="accent1"/>
+          </a:effectRef>
+          <a:fontRef idx="minor">
+            <a:schemeClr val="tx1"/>
+          </a:fontRef>
+        </p:style>
+      </p:cxnSp>
+      <p:cxnSp>
+        <p:nvCxnSpPr>
+          <p:cNvPr id="199" name="Straight Arrow Connector 198"/>
+          <p:cNvCxnSpPr>
+            <a:stCxn id="15" idx="6"/>
+            <a:endCxn id="53" idx="2"/>
+          </p:cNvCxnSpPr>
+          <p:nvPr/>
+        </p:nvCxnSpPr>
+        <p:spPr>
+          <a:xfrm>
+            <a:off x="3136868" y="1411928"/>
+            <a:ext cx="2469597" cy="2764530"/>
+          </a:xfrm>
+          <a:prstGeom prst="straightConnector1">
+            <a:avLst/>
+          </a:prstGeom>
+          <a:ln>
+            <a:tailEnd type="triangle"/>
+          </a:ln>
+        </p:spPr>
+        <p:style>
+          <a:lnRef idx="1">
+            <a:schemeClr val="accent1"/>
+          </a:lnRef>
+          <a:fillRef idx="0">
+            <a:schemeClr val="accent1"/>
+          </a:fillRef>
+          <a:effectRef idx="0">
+            <a:schemeClr val="accent1"/>
+          </a:effectRef>
+          <a:fontRef idx="minor">
+            <a:schemeClr val="tx1"/>
+          </a:fontRef>
+        </p:style>
+      </p:cxnSp>
+      <p:cxnSp>
+        <p:nvCxnSpPr>
+          <p:cNvPr id="202" name="Straight Arrow Connector 201"/>
+          <p:cNvCxnSpPr>
+            <a:stCxn id="15" idx="6"/>
+            <a:endCxn id="54" idx="2"/>
+          </p:cNvCxnSpPr>
+          <p:nvPr/>
+        </p:nvCxnSpPr>
+        <p:spPr>
+          <a:xfrm>
+            <a:off x="3136868" y="1411928"/>
+            <a:ext cx="2469597" cy="3076115"/>
+          </a:xfrm>
+          <a:prstGeom prst="straightConnector1">
+            <a:avLst/>
+          </a:prstGeom>
+          <a:ln>
+            <a:tailEnd type="triangle"/>
+          </a:ln>
+        </p:spPr>
+        <p:style>
+          <a:lnRef idx="1">
+            <a:schemeClr val="accent1"/>
+          </a:lnRef>
+          <a:fillRef idx="0">
+            <a:schemeClr val="accent1"/>
+          </a:fillRef>
+          <a:effectRef idx="0">
+            <a:schemeClr val="accent1"/>
+          </a:effectRef>
+          <a:fontRef idx="minor">
+            <a:schemeClr val="tx1"/>
+          </a:fontRef>
+        </p:style>
+      </p:cxnSp>
+      <p:cxnSp>
+        <p:nvCxnSpPr>
+          <p:cNvPr id="205" name="Straight Arrow Connector 204"/>
+          <p:cNvCxnSpPr>
+            <a:stCxn id="15" idx="6"/>
+            <a:endCxn id="55" idx="2"/>
+          </p:cNvCxnSpPr>
+          <p:nvPr/>
+        </p:nvCxnSpPr>
+        <p:spPr>
+          <a:xfrm>
+            <a:off x="3136868" y="1411928"/>
+            <a:ext cx="2469597" cy="3381400"/>
+          </a:xfrm>
+          <a:prstGeom prst="straightConnector1">
+            <a:avLst/>
+          </a:prstGeom>
+          <a:ln>
+            <a:tailEnd type="triangle"/>
+          </a:ln>
+        </p:spPr>
+        <p:style>
+          <a:lnRef idx="1">
+            <a:schemeClr val="accent1"/>
+          </a:lnRef>
+          <a:fillRef idx="0">
+            <a:schemeClr val="accent1"/>
+          </a:fillRef>
+          <a:effectRef idx="0">
+            <a:schemeClr val="accent1"/>
+          </a:effectRef>
+          <a:fontRef idx="minor">
+            <a:schemeClr val="tx1"/>
+          </a:fontRef>
+        </p:style>
+      </p:cxnSp>
+      <p:cxnSp>
+        <p:nvCxnSpPr>
+          <p:cNvPr id="208" name="Straight Arrow Connector 207"/>
+          <p:cNvCxnSpPr>
+            <a:stCxn id="15" idx="6"/>
+            <a:endCxn id="56" idx="2"/>
+          </p:cNvCxnSpPr>
+          <p:nvPr/>
+        </p:nvCxnSpPr>
+        <p:spPr>
+          <a:xfrm>
+            <a:off x="3136868" y="1411928"/>
+            <a:ext cx="2469597" cy="3691530"/>
+          </a:xfrm>
+          <a:prstGeom prst="straightConnector1">
+            <a:avLst/>
+          </a:prstGeom>
+          <a:ln>
+            <a:tailEnd type="triangle"/>
+          </a:ln>
+        </p:spPr>
+        <p:style>
+          <a:lnRef idx="1">
+            <a:schemeClr val="accent1"/>
+          </a:lnRef>
+          <a:fillRef idx="0">
+            <a:schemeClr val="accent1"/>
+          </a:fillRef>
+          <a:effectRef idx="0">
+            <a:schemeClr val="accent1"/>
+          </a:effectRef>
+          <a:fontRef idx="minor">
+            <a:schemeClr val="tx1"/>
+          </a:fontRef>
+        </p:style>
+      </p:cxnSp>
+      <p:cxnSp>
+        <p:nvCxnSpPr>
+          <p:cNvPr id="210" name="Straight Arrow Connector 209"/>
+          <p:cNvCxnSpPr>
+            <a:stCxn id="15" idx="6"/>
+            <a:endCxn id="57" idx="2"/>
+          </p:cNvCxnSpPr>
+          <p:nvPr/>
+        </p:nvCxnSpPr>
+        <p:spPr>
+          <a:xfrm>
+            <a:off x="3136868" y="1411928"/>
+            <a:ext cx="2469597" cy="3996815"/>
+          </a:xfrm>
+          <a:prstGeom prst="straightConnector1">
+            <a:avLst/>
+          </a:prstGeom>
+          <a:ln>
+            <a:tailEnd type="triangle"/>
+          </a:ln>
+        </p:spPr>
+        <p:style>
+          <a:lnRef idx="1">
+            <a:schemeClr val="accent1"/>
+          </a:lnRef>
+          <a:fillRef idx="0">
+            <a:schemeClr val="accent1"/>
+          </a:fillRef>
+          <a:effectRef idx="0">
+            <a:schemeClr val="accent1"/>
+          </a:effectRef>
+          <a:fontRef idx="minor">
+            <a:schemeClr val="tx1"/>
+          </a:fontRef>
+        </p:style>
+      </p:cxnSp>
+      <p:cxnSp>
+        <p:nvCxnSpPr>
+          <p:cNvPr id="212" name="Straight Arrow Connector 211"/>
+          <p:cNvCxnSpPr>
+            <a:stCxn id="15" idx="6"/>
+            <a:endCxn id="58" idx="2"/>
+          </p:cNvCxnSpPr>
+          <p:nvPr/>
+        </p:nvCxnSpPr>
+        <p:spPr>
+          <a:xfrm>
+            <a:off x="3136868" y="1411928"/>
+            <a:ext cx="2469597" cy="4302100"/>
+          </a:xfrm>
+          <a:prstGeom prst="straightConnector1">
+            <a:avLst/>
+          </a:prstGeom>
+          <a:ln>
+            <a:tailEnd type="triangle"/>
+          </a:ln>
+        </p:spPr>
+        <p:style>
+          <a:lnRef idx="1">
+            <a:schemeClr val="accent1"/>
+          </a:lnRef>
+          <a:fillRef idx="0">
+            <a:schemeClr val="accent1"/>
+          </a:fillRef>
+          <a:effectRef idx="0">
+            <a:schemeClr val="accent1"/>
+          </a:effectRef>
+          <a:fontRef idx="minor">
+            <a:schemeClr val="tx1"/>
+          </a:fontRef>
+        </p:style>
+      </p:cxnSp>
+      <p:cxnSp>
+        <p:nvCxnSpPr>
+          <p:cNvPr id="214" name="Straight Arrow Connector 213"/>
+          <p:cNvCxnSpPr>
+            <a:stCxn id="15" idx="6"/>
+            <a:endCxn id="59" idx="2"/>
+          </p:cNvCxnSpPr>
+          <p:nvPr/>
+        </p:nvCxnSpPr>
+        <p:spPr>
+          <a:xfrm>
+            <a:off x="3136868" y="1411928"/>
+            <a:ext cx="2469597" cy="4607385"/>
+          </a:xfrm>
+          <a:prstGeom prst="straightConnector1">
+            <a:avLst/>
+          </a:prstGeom>
+          <a:ln>
+            <a:tailEnd type="triangle"/>
+          </a:ln>
+        </p:spPr>
+        <p:style>
+          <a:lnRef idx="1">
+            <a:schemeClr val="accent1"/>
+          </a:lnRef>
+          <a:fillRef idx="0">
+            <a:schemeClr val="accent1"/>
+          </a:fillRef>
+          <a:effectRef idx="0">
+            <a:schemeClr val="accent1"/>
+          </a:effectRef>
+          <a:fontRef idx="minor">
+            <a:schemeClr val="tx1"/>
+          </a:fontRef>
+        </p:style>
+      </p:cxnSp>
+      <p:cxnSp>
+        <p:nvCxnSpPr>
+          <p:cNvPr id="216" name="Straight Arrow Connector 215"/>
+          <p:cNvCxnSpPr>
+            <a:stCxn id="15" idx="6"/>
+            <a:endCxn id="60" idx="2"/>
+          </p:cNvCxnSpPr>
+          <p:nvPr/>
+        </p:nvCxnSpPr>
+        <p:spPr>
+          <a:xfrm>
+            <a:off x="3136868" y="1411928"/>
+            <a:ext cx="2469597" cy="4917515"/>
+          </a:xfrm>
+          <a:prstGeom prst="straightConnector1">
+            <a:avLst/>
+          </a:prstGeom>
+          <a:ln>
+            <a:tailEnd type="triangle"/>
+          </a:ln>
+        </p:spPr>
+        <p:style>
+          <a:lnRef idx="1">
+            <a:schemeClr val="accent1"/>
+          </a:lnRef>
+          <a:fillRef idx="0">
+            <a:schemeClr val="accent1"/>
+          </a:fillRef>
+          <a:effectRef idx="0">
+            <a:schemeClr val="accent1"/>
+          </a:effectRef>
+          <a:fontRef idx="minor">
+            <a:schemeClr val="tx1"/>
+          </a:fontRef>
+        </p:style>
+      </p:cxnSp>
+      <p:cxnSp>
+        <p:nvCxnSpPr>
+          <p:cNvPr id="218" name="Straight Arrow Connector 217"/>
+          <p:cNvCxnSpPr>
+            <a:stCxn id="15" idx="6"/>
+            <a:endCxn id="61" idx="2"/>
+          </p:cNvCxnSpPr>
+          <p:nvPr/>
+        </p:nvCxnSpPr>
+        <p:spPr>
+          <a:xfrm>
+            <a:off x="3136868" y="1411928"/>
+            <a:ext cx="2469597" cy="5222800"/>
+          </a:xfrm>
+          <a:prstGeom prst="straightConnector1">
+            <a:avLst/>
+          </a:prstGeom>
+          <a:ln>
+            <a:tailEnd type="triangle"/>
+          </a:ln>
+        </p:spPr>
+        <p:style>
+          <a:lnRef idx="1">
+            <a:schemeClr val="accent1"/>
+          </a:lnRef>
+          <a:fillRef idx="0">
+            <a:schemeClr val="accent1"/>
+          </a:fillRef>
+          <a:effectRef idx="0">
+            <a:schemeClr val="accent1"/>
+          </a:effectRef>
+          <a:fontRef idx="minor">
+            <a:schemeClr val="tx1"/>
+          </a:fontRef>
+        </p:style>
+      </p:cxnSp>
+      <p:cxnSp>
+        <p:nvCxnSpPr>
+          <p:cNvPr id="99" name="Straight Arrow Connector 98"/>
+          <p:cNvCxnSpPr>
+            <a:stCxn id="42" idx="6"/>
+            <a:endCxn id="3" idx="2"/>
+          </p:cNvCxnSpPr>
+          <p:nvPr/>
+        </p:nvCxnSpPr>
+        <p:spPr>
+          <a:xfrm>
+            <a:off x="5832952" y="787117"/>
+            <a:ext cx="2426948" cy="991521"/>
+          </a:xfrm>
+          <a:prstGeom prst="straightConnector1">
+            <a:avLst/>
+          </a:prstGeom>
+          <a:ln>
+            <a:tailEnd type="triangle"/>
+          </a:ln>
+        </p:spPr>
+        <p:style>
+          <a:lnRef idx="1">
+            <a:schemeClr val="accent1"/>
+          </a:lnRef>
+          <a:fillRef idx="0">
+            <a:schemeClr val="accent1"/>
+          </a:fillRef>
+          <a:effectRef idx="0">
+            <a:schemeClr val="accent1"/>
+          </a:effectRef>
+          <a:fontRef idx="minor">
+            <a:schemeClr val="tx1"/>
+          </a:fontRef>
+        </p:style>
+      </p:cxnSp>
+      <p:cxnSp>
+        <p:nvCxnSpPr>
+          <p:cNvPr id="102" name="Straight Arrow Connector 101"/>
+          <p:cNvCxnSpPr>
+            <a:stCxn id="42" idx="6"/>
+            <a:endCxn id="4" idx="2"/>
+          </p:cNvCxnSpPr>
+          <p:nvPr/>
+        </p:nvCxnSpPr>
+        <p:spPr>
+          <a:xfrm>
+            <a:off x="5832952" y="787117"/>
+            <a:ext cx="2426948" cy="1767376"/>
+          </a:xfrm>
+          <a:prstGeom prst="straightConnector1">
+            <a:avLst/>
+          </a:prstGeom>
+          <a:ln>
+            <a:tailEnd type="triangle"/>
+          </a:ln>
+        </p:spPr>
+        <p:style>
+          <a:lnRef idx="1">
+            <a:schemeClr val="accent1"/>
+          </a:lnRef>
+          <a:fillRef idx="0">
+            <a:schemeClr val="accent1"/>
+          </a:fillRef>
+          <a:effectRef idx="0">
+            <a:schemeClr val="accent1"/>
+          </a:effectRef>
+          <a:fontRef idx="minor">
+            <a:schemeClr val="tx1"/>
+          </a:fontRef>
+        </p:style>
+      </p:cxnSp>
+      <p:cxnSp>
+        <p:nvCxnSpPr>
+          <p:cNvPr id="105" name="Straight Arrow Connector 104"/>
+          <p:cNvCxnSpPr>
+            <a:stCxn id="42" idx="6"/>
+            <a:endCxn id="7" idx="2"/>
+          </p:cNvCxnSpPr>
+          <p:nvPr/>
+        </p:nvCxnSpPr>
+        <p:spPr>
+          <a:xfrm>
+            <a:off x="5832952" y="787117"/>
+            <a:ext cx="2426948" cy="2540460"/>
+          </a:xfrm>
+          <a:prstGeom prst="straightConnector1">
+            <a:avLst/>
+          </a:prstGeom>
+          <a:ln>
+            <a:tailEnd type="triangle"/>
+          </a:ln>
+        </p:spPr>
+        <p:style>
+          <a:lnRef idx="1">
+            <a:schemeClr val="accent1"/>
+          </a:lnRef>
+          <a:fillRef idx="0">
+            <a:schemeClr val="accent1"/>
+          </a:fillRef>
+          <a:effectRef idx="0">
+            <a:schemeClr val="accent1"/>
+          </a:effectRef>
+          <a:fontRef idx="minor">
+            <a:schemeClr val="tx1"/>
+          </a:fontRef>
+        </p:style>
+      </p:cxnSp>
+      <p:cxnSp>
+        <p:nvCxnSpPr>
+          <p:cNvPr id="107" name="Straight Arrow Connector 106"/>
+          <p:cNvCxnSpPr/>
+          <p:nvPr/>
+        </p:nvCxnSpPr>
+        <p:spPr>
+          <a:xfrm>
+            <a:off x="5824965" y="765848"/>
+            <a:ext cx="2430975" cy="3313544"/>
+          </a:xfrm>
+          <a:prstGeom prst="straightConnector1">
+            <a:avLst/>
+          </a:prstGeom>
+          <a:ln>
+            <a:tailEnd type="triangle"/>
+          </a:ln>
+        </p:spPr>
+        <p:style>
+          <a:lnRef idx="1">
+            <a:schemeClr val="accent1"/>
+          </a:lnRef>
+          <a:fillRef idx="0">
+            <a:schemeClr val="accent1"/>
+          </a:fillRef>
+          <a:effectRef idx="0">
+            <a:schemeClr val="accent1"/>
+          </a:effectRef>
+          <a:fontRef idx="minor">
+            <a:schemeClr val="tx1"/>
+          </a:fontRef>
+        </p:style>
+      </p:cxnSp>
+      <p:cxnSp>
+        <p:nvCxnSpPr>
+          <p:cNvPr id="111" name="Straight Arrow Connector 110"/>
+          <p:cNvCxnSpPr>
+            <a:stCxn id="42" idx="6"/>
+            <a:endCxn id="63" idx="2"/>
+          </p:cNvCxnSpPr>
+          <p:nvPr/>
+        </p:nvCxnSpPr>
+        <p:spPr>
+          <a:xfrm>
+            <a:off x="5832952" y="787117"/>
+            <a:ext cx="2430975" cy="4089399"/>
+          </a:xfrm>
+          <a:prstGeom prst="straightConnector1">
+            <a:avLst/>
+          </a:prstGeom>
+          <a:ln>
+            <a:tailEnd type="triangle"/>
+          </a:ln>
+        </p:spPr>
+        <p:style>
+          <a:lnRef idx="1">
+            <a:schemeClr val="accent1"/>
+          </a:lnRef>
+          <a:fillRef idx="0">
+            <a:schemeClr val="accent1"/>
+          </a:fillRef>
+          <a:effectRef idx="0">
+            <a:schemeClr val="accent1"/>
+          </a:effectRef>
+          <a:fontRef idx="minor">
+            <a:schemeClr val="tx1"/>
+          </a:fontRef>
+        </p:style>
+      </p:cxnSp>
+      <p:cxnSp>
+        <p:nvCxnSpPr>
+          <p:cNvPr id="113" name="Straight Arrow Connector 112"/>
+          <p:cNvCxnSpPr>
+            <a:stCxn id="42" idx="6"/>
+            <a:endCxn id="64" idx="2"/>
+          </p:cNvCxnSpPr>
+          <p:nvPr/>
+        </p:nvCxnSpPr>
+        <p:spPr>
+          <a:xfrm>
+            <a:off x="5832952" y="787117"/>
+            <a:ext cx="2430975" cy="4862483"/>
+          </a:xfrm>
+          <a:prstGeom prst="straightConnector1">
+            <a:avLst/>
+          </a:prstGeom>
+          <a:ln>
+            <a:tailEnd type="triangle"/>
+          </a:ln>
+        </p:spPr>
+        <p:style>
+          <a:lnRef idx="1">
+            <a:schemeClr val="accent1"/>
+          </a:lnRef>
+          <a:fillRef idx="0">
+            <a:schemeClr val="accent1"/>
+          </a:fillRef>
+          <a:effectRef idx="0">
+            <a:schemeClr val="accent1"/>
+          </a:effectRef>
+          <a:fontRef idx="minor">
+            <a:schemeClr val="tx1"/>
+          </a:fontRef>
+        </p:style>
+      </p:cxnSp>
+      <p:cxnSp>
+        <p:nvCxnSpPr>
+          <p:cNvPr id="116" name="Straight Arrow Connector 115"/>
+          <p:cNvCxnSpPr>
+            <a:stCxn id="61" idx="6"/>
+            <a:endCxn id="3" idx="2"/>
+          </p:cNvCxnSpPr>
+          <p:nvPr/>
+        </p:nvCxnSpPr>
+        <p:spPr>
+          <a:xfrm flipV="1">
+            <a:off x="5826978" y="1778638"/>
+            <a:ext cx="2432922" cy="4856090"/>
+          </a:xfrm>
+          <a:prstGeom prst="straightConnector1">
+            <a:avLst/>
+          </a:prstGeom>
+          <a:ln>
+            <a:tailEnd type="triangle"/>
+          </a:ln>
+        </p:spPr>
+        <p:style>
+          <a:lnRef idx="1">
+            <a:schemeClr val="accent1"/>
+          </a:lnRef>
+          <a:fillRef idx="0">
+            <a:schemeClr val="accent1"/>
+          </a:fillRef>
+          <a:effectRef idx="0">
+            <a:schemeClr val="accent1"/>
+          </a:effectRef>
+          <a:fontRef idx="minor">
+            <a:schemeClr val="tx1"/>
+          </a:fontRef>
+        </p:style>
+      </p:cxnSp>
+      <p:cxnSp>
+        <p:nvCxnSpPr>
+          <p:cNvPr id="120" name="Straight Arrow Connector 119"/>
+          <p:cNvCxnSpPr>
+            <a:stCxn id="61" idx="6"/>
+            <a:endCxn id="4" idx="2"/>
+          </p:cNvCxnSpPr>
+          <p:nvPr/>
+        </p:nvCxnSpPr>
+        <p:spPr>
+          <a:xfrm flipV="1">
+            <a:off x="5826978" y="2554493"/>
+            <a:ext cx="2432922" cy="4080235"/>
+          </a:xfrm>
+          <a:prstGeom prst="straightConnector1">
+            <a:avLst/>
+          </a:prstGeom>
+          <a:ln>
+            <a:tailEnd type="triangle"/>
+          </a:ln>
+        </p:spPr>
+        <p:style>
+          <a:lnRef idx="1">
+            <a:schemeClr val="accent1"/>
+          </a:lnRef>
+          <a:fillRef idx="0">
+            <a:schemeClr val="accent1"/>
+          </a:fillRef>
+          <a:effectRef idx="0">
+            <a:schemeClr val="accent1"/>
+          </a:effectRef>
+          <a:fontRef idx="minor">
+            <a:schemeClr val="tx1"/>
+          </a:fontRef>
+        </p:style>
+      </p:cxnSp>
+      <p:cxnSp>
+        <p:nvCxnSpPr>
+          <p:cNvPr id="124" name="Straight Arrow Connector 123"/>
+          <p:cNvCxnSpPr>
+            <a:stCxn id="61" idx="6"/>
+            <a:endCxn id="7" idx="2"/>
+          </p:cNvCxnSpPr>
+          <p:nvPr/>
+        </p:nvCxnSpPr>
+        <p:spPr>
+          <a:xfrm flipV="1">
+            <a:off x="5826978" y="3327577"/>
+            <a:ext cx="2432922" cy="3307151"/>
+          </a:xfrm>
+          <a:prstGeom prst="straightConnector1">
+            <a:avLst/>
+          </a:prstGeom>
+          <a:ln>
+            <a:tailEnd type="triangle"/>
+          </a:ln>
+        </p:spPr>
+        <p:style>
+          <a:lnRef idx="1">
+            <a:schemeClr val="accent1"/>
+          </a:lnRef>
+          <a:fillRef idx="0">
+            <a:schemeClr val="accent1"/>
+          </a:fillRef>
+          <a:effectRef idx="0">
+            <a:schemeClr val="accent1"/>
+          </a:effectRef>
+          <a:fontRef idx="minor">
+            <a:schemeClr val="tx1"/>
+          </a:fontRef>
+        </p:style>
+      </p:cxnSp>
+      <p:cxnSp>
+        <p:nvCxnSpPr>
+          <p:cNvPr id="127" name="Straight Arrow Connector 126"/>
+          <p:cNvCxnSpPr>
+            <a:stCxn id="61" idx="6"/>
+            <a:endCxn id="62" idx="2"/>
+          </p:cNvCxnSpPr>
+          <p:nvPr/>
+        </p:nvCxnSpPr>
+        <p:spPr>
+          <a:xfrm flipV="1">
+            <a:off x="5826978" y="4100661"/>
+            <a:ext cx="2436949" cy="2534067"/>
+          </a:xfrm>
+          <a:prstGeom prst="straightConnector1">
+            <a:avLst/>
+          </a:prstGeom>
+          <a:ln>
+            <a:tailEnd type="triangle"/>
+          </a:ln>
+        </p:spPr>
+        <p:style>
+          <a:lnRef idx="1">
+            <a:schemeClr val="accent1"/>
+          </a:lnRef>
+          <a:fillRef idx="0">
+            <a:schemeClr val="accent1"/>
+          </a:fillRef>
+          <a:effectRef idx="0">
+            <a:schemeClr val="accent1"/>
+          </a:effectRef>
+          <a:fontRef idx="minor">
+            <a:schemeClr val="tx1"/>
+          </a:fontRef>
+        </p:style>
+      </p:cxnSp>
+      <p:cxnSp>
+        <p:nvCxnSpPr>
+          <p:cNvPr id="129" name="Straight Arrow Connector 128"/>
+          <p:cNvCxnSpPr>
+            <a:stCxn id="61" idx="6"/>
+            <a:endCxn id="63" idx="2"/>
+          </p:cNvCxnSpPr>
+          <p:nvPr/>
+        </p:nvCxnSpPr>
+        <p:spPr>
+          <a:xfrm flipV="1">
+            <a:off x="5826978" y="4876516"/>
+            <a:ext cx="2436949" cy="1758212"/>
+          </a:xfrm>
+          <a:prstGeom prst="straightConnector1">
+            <a:avLst/>
+          </a:prstGeom>
+          <a:ln>
+            <a:tailEnd type="triangle"/>
+          </a:ln>
+        </p:spPr>
+        <p:style>
+          <a:lnRef idx="1">
+            <a:schemeClr val="accent1"/>
+          </a:lnRef>
+          <a:fillRef idx="0">
+            <a:schemeClr val="accent1"/>
+          </a:fillRef>
+          <a:effectRef idx="0">
+            <a:schemeClr val="accent1"/>
+          </a:effectRef>
+          <a:fontRef idx="minor">
+            <a:schemeClr val="tx1"/>
+          </a:fontRef>
+        </p:style>
+      </p:cxnSp>
+      <p:cxnSp>
+        <p:nvCxnSpPr>
+          <p:cNvPr id="133" name="Straight Arrow Connector 132"/>
+          <p:cNvCxnSpPr>
+            <a:stCxn id="61" idx="6"/>
+            <a:endCxn id="64" idx="2"/>
+          </p:cNvCxnSpPr>
+          <p:nvPr/>
+        </p:nvCxnSpPr>
+        <p:spPr>
+          <a:xfrm flipV="1">
+            <a:off x="5826978" y="5649600"/>
+            <a:ext cx="2436949" cy="985128"/>
+          </a:xfrm>
+          <a:prstGeom prst="straightConnector1">
+            <a:avLst/>
+          </a:prstGeom>
+          <a:ln>
+            <a:tailEnd type="triangle"/>
+          </a:ln>
+        </p:spPr>
+        <p:style>
+          <a:lnRef idx="1">
+            <a:schemeClr val="accent1"/>
+          </a:lnRef>
+          <a:fillRef idx="0">
+            <a:schemeClr val="accent1"/>
+          </a:fillRef>
+          <a:effectRef idx="0">
+            <a:schemeClr val="accent1"/>
+          </a:effectRef>
+          <a:fontRef idx="minor">
+            <a:schemeClr val="tx1"/>
+          </a:fontRef>
+        </p:style>
+      </p:cxnSp>
+    </p:spTree>
+    <p:extLst>
+      <p:ext uri="{BB962C8B-B14F-4D97-AF65-F5344CB8AC3E}">
+        <p14:creationId xmlns:p14="http://schemas.microsoft.com/office/powerpoint/2010/main" val="1125542742"/>
+      </p:ext>
+    </p:extLst>
+  </p:cSld>
+  <p:clrMapOvr>
+    <a:masterClrMapping/>
+  </p:clrMapOvr>
+  <p:timing>
+    <p:tnLst>
+      <p:par>
+        <p:cTn id="1" dur="indefinite" restart="never" nodeType="tmRoot"/>
+      </p:par>
+    </p:tnLst>
+  </p:timing>
+</p:sld>
+</file>
+
 <file path=ppt/theme/theme1.xml><?xml version="1.0" encoding="utf-8"?>
 <a:theme xmlns:a="http://schemas.openxmlformats.org/drawingml/2006/main" name="Office Theme">
   <a:themeElements>

</xml_diff>